<commit_message>
add Mockups in presntation
</commit_message>
<xml_diff>
--- a/for submation/sprint 1 +Backlog/Sprint1_Deliverables_Template.pptx
+++ b/for submation/sprint 1 +Backlog/Sprint1_Deliverables_Template.pptx
@@ -27,21 +27,24 @@
     <p:sldId id="285" r:id="rId21"/>
     <p:sldId id="289" r:id="rId22"/>
     <p:sldId id="290" r:id="rId23"/>
-    <p:sldId id="282" r:id="rId24"/>
-    <p:sldId id="286" r:id="rId25"/>
-    <p:sldId id="287" r:id="rId26"/>
-    <p:sldId id="291" r:id="rId27"/>
-    <p:sldId id="283" r:id="rId28"/>
-    <p:sldId id="288" r:id="rId29"/>
-    <p:sldId id="292" r:id="rId30"/>
-    <p:sldId id="293" r:id="rId31"/>
-    <p:sldId id="294" r:id="rId32"/>
-    <p:sldId id="260" r:id="rId33"/>
-    <p:sldId id="261" r:id="rId34"/>
-    <p:sldId id="263" r:id="rId35"/>
-    <p:sldId id="264" r:id="rId36"/>
-    <p:sldId id="265" r:id="rId37"/>
-    <p:sldId id="280" r:id="rId38"/>
+    <p:sldId id="295" r:id="rId24"/>
+    <p:sldId id="282" r:id="rId25"/>
+    <p:sldId id="286" r:id="rId26"/>
+    <p:sldId id="287" r:id="rId27"/>
+    <p:sldId id="291" r:id="rId28"/>
+    <p:sldId id="296" r:id="rId29"/>
+    <p:sldId id="283" r:id="rId30"/>
+    <p:sldId id="288" r:id="rId31"/>
+    <p:sldId id="292" r:id="rId32"/>
+    <p:sldId id="293" r:id="rId33"/>
+    <p:sldId id="294" r:id="rId34"/>
+    <p:sldId id="297" r:id="rId35"/>
+    <p:sldId id="260" r:id="rId36"/>
+    <p:sldId id="261" r:id="rId37"/>
+    <p:sldId id="263" r:id="rId38"/>
+    <p:sldId id="264" r:id="rId39"/>
+    <p:sldId id="265" r:id="rId40"/>
+    <p:sldId id="280" r:id="rId41"/>
   </p:sldIdLst>
   <p:sldSz cx="9144000" cy="6858000" type="screen4x3"/>
   <p:notesSz cx="6858000" cy="9144000"/>
@@ -14188,6 +14191,144 @@
     </p:bg>
     <p:spTree>
       <p:nvGrpSpPr>
+        <p:cNvPr id="1" name=""/>
+        <p:cNvGrpSpPr/>
+        <p:nvPr/>
+      </p:nvGrpSpPr>
+      <p:grpSpPr>
+        <a:xfrm>
+          <a:off x="0" y="0"/>
+          <a:ext cx="0" cy="0"/>
+          <a:chOff x="0" y="0"/>
+          <a:chExt cx="0" cy="0"/>
+        </a:xfrm>
+      </p:grpSpPr>
+      <p:sp useBgFill="1">
+        <p:nvSpPr>
+          <p:cNvPr id="24" name="Rectangle 23">
+            <a:extLst>
+              <a:ext uri="{FF2B5EF4-FFF2-40B4-BE49-F238E27FC236}">
+                <a16:creationId xmlns:a16="http://schemas.microsoft.com/office/drawing/2014/main" id="{E2BA2BD9-7B54-4190-8F06-3EF3658A0020}"/>
+              </a:ext>
+              <a:ext uri="{C183D7F6-B498-43B3-948B-1728B52AA6E4}">
+                <adec:decorative xmlns:adec="http://schemas.microsoft.com/office/drawing/2017/decorative" val="1"/>
+              </a:ext>
+            </a:extLst>
+          </p:cNvPr>
+          <p:cNvSpPr>
+            <a:spLocks noGrp="1" noRot="1" noChangeAspect="1" noMove="1" noResize="1" noEditPoints="1" noAdjustHandles="1" noChangeArrowheads="1" noChangeShapeType="1" noTextEdit="1"/>
+          </p:cNvSpPr>
+          <p:nvPr>
+            <p:extLst>
+              <p:ext uri="{386F3935-93C4-4BCD-93E2-E3B085C9AB24}">
+                <p16:designElem xmlns:p16="http://schemas.microsoft.com/office/powerpoint/2015/main" val="1"/>
+              </p:ext>
+            </p:extLst>
+          </p:nvPr>
+        </p:nvSpPr>
+        <p:spPr>
+          <a:xfrm>
+            <a:off x="0" y="0"/>
+            <a:ext cx="9144000" cy="6858000"/>
+          </a:xfrm>
+          <a:prstGeom prst="rect">
+            <a:avLst/>
+          </a:prstGeom>
+          <a:ln>
+            <a:noFill/>
+          </a:ln>
+        </p:spPr>
+        <p:style>
+          <a:lnRef idx="2">
+            <a:schemeClr val="accent1">
+              <a:shade val="50000"/>
+            </a:schemeClr>
+          </a:lnRef>
+          <a:fillRef idx="1">
+            <a:schemeClr val="accent1"/>
+          </a:fillRef>
+          <a:effectRef idx="0">
+            <a:schemeClr val="accent1"/>
+          </a:effectRef>
+          <a:fontRef idx="minor">
+            <a:schemeClr val="lt1"/>
+          </a:fontRef>
+        </p:style>
+        <p:txBody>
+          <a:bodyPr rtlCol="0" anchor="ctr"/>
+          <a:lstStyle/>
+          <a:p>
+            <a:pPr algn="ctr"/>
+            <a:endParaRPr lang="en-US"/>
+          </a:p>
+        </p:txBody>
+      </p:sp>
+      <p:pic>
+        <p:nvPicPr>
+          <p:cNvPr id="5" name="Content Placeholder 4" descr="A screenshot of a login page">
+            <a:extLst>
+              <a:ext uri="{FF2B5EF4-FFF2-40B4-BE49-F238E27FC236}">
+                <a16:creationId xmlns:a16="http://schemas.microsoft.com/office/drawing/2014/main" id="{685C41B4-7F54-F082-E575-A8868B07904A}"/>
+              </a:ext>
+            </a:extLst>
+          </p:cNvPr>
+          <p:cNvPicPr>
+            <a:picLocks noGrp="1" noChangeAspect="1"/>
+          </p:cNvPicPr>
+          <p:nvPr>
+            <p:ph idx="1"/>
+          </p:nvPr>
+        </p:nvPicPr>
+        <p:blipFill>
+          <a:blip r:embed="rId2"/>
+          <a:srcRect r="5334" b="1"/>
+          <a:stretch>
+            <a:fillRect/>
+          </a:stretch>
+        </p:blipFill>
+        <p:spPr>
+          <a:xfrm>
+            <a:off x="20" y="10"/>
+            <a:ext cx="9143979" cy="6857988"/>
+          </a:xfrm>
+          <a:prstGeom prst="rect">
+            <a:avLst/>
+          </a:prstGeom>
+          <a:effectLst>
+            <a:outerShdw blurRad="596900" dist="330200" dir="8820000" sx="87000" sy="87000" algn="ctr" rotWithShape="0">
+              <a:srgbClr val="000000">
+                <a:alpha val="29000"/>
+              </a:srgbClr>
+            </a:outerShdw>
+          </a:effectLst>
+        </p:spPr>
+      </p:pic>
+    </p:spTree>
+    <p:extLst>
+      <p:ext uri="{BB962C8B-B14F-4D97-AF65-F5344CB8AC3E}">
+        <p14:creationId xmlns:p14="http://schemas.microsoft.com/office/powerpoint/2010/main" val="165420167"/>
+      </p:ext>
+    </p:extLst>
+  </p:cSld>
+  <p:clrMapOvr>
+    <a:masterClrMapping/>
+  </p:clrMapOvr>
+</p:sld>
+</file>
+
+<file path=ppt/slides/slide24.xml><?xml version="1.0" encoding="utf-8"?>
+<p:sld xmlns:a="http://schemas.openxmlformats.org/drawingml/2006/main" xmlns:r="http://schemas.openxmlformats.org/officeDocument/2006/relationships" xmlns:p="http://schemas.openxmlformats.org/presentationml/2006/main">
+  <p:cSld>
+    <p:bg>
+      <p:bgPr>
+        <a:solidFill>
+          <a:schemeClr val="bg1"/>
+        </a:solidFill>
+        <a:effectLst/>
+      </p:bgPr>
+    </p:bg>
+    <p:spTree>
+      <p:nvGrpSpPr>
         <p:cNvPr id="1" name="">
           <a:extLst>
             <a:ext uri="{FF2B5EF4-FFF2-40B4-BE49-F238E27FC236}">
@@ -15400,7 +15541,7 @@
 </p:sld>
 </file>
 
-<file path=ppt/slides/slide24.xml><?xml version="1.0" encoding="utf-8"?>
+<file path=ppt/slides/slide25.xml><?xml version="1.0" encoding="utf-8"?>
 <p:sld xmlns:a="http://schemas.openxmlformats.org/drawingml/2006/main" xmlns:r="http://schemas.openxmlformats.org/officeDocument/2006/relationships" xmlns:p="http://schemas.openxmlformats.org/presentationml/2006/main">
   <p:cSld>
     <p:bg>
@@ -15815,7 +15956,7 @@
 </p:sld>
 </file>
 
-<file path=ppt/slides/slide25.xml><?xml version="1.0" encoding="utf-8"?>
+<file path=ppt/slides/slide26.xml><?xml version="1.0" encoding="utf-8"?>
 <p:sld xmlns:a="http://schemas.openxmlformats.org/drawingml/2006/main" xmlns:r="http://schemas.openxmlformats.org/officeDocument/2006/relationships" xmlns:p="http://schemas.openxmlformats.org/presentationml/2006/main">
   <p:cSld>
     <p:bg>
@@ -16313,7 +16454,7 @@
 </p:sld>
 </file>
 
-<file path=ppt/slides/slide26.xml><?xml version="1.0" encoding="utf-8"?>
+<file path=ppt/slides/slide27.xml><?xml version="1.0" encoding="utf-8"?>
 <p:sld xmlns:a="http://schemas.openxmlformats.org/drawingml/2006/main" xmlns:r="http://schemas.openxmlformats.org/officeDocument/2006/relationships" xmlns:p="http://schemas.openxmlformats.org/presentationml/2006/main">
   <p:cSld>
     <p:bg>
@@ -16763,7 +16904,233 @@
 </p:sld>
 </file>
 
-<file path=ppt/slides/slide27.xml><?xml version="1.0" encoding="utf-8"?>
+<file path=ppt/slides/slide28.xml><?xml version="1.0" encoding="utf-8"?>
+<p:sld xmlns:a="http://schemas.openxmlformats.org/drawingml/2006/main" xmlns:r="http://schemas.openxmlformats.org/officeDocument/2006/relationships" xmlns:p="http://schemas.openxmlformats.org/presentationml/2006/main">
+  <p:cSld>
+    <p:bg>
+      <p:bgPr>
+        <a:solidFill>
+          <a:schemeClr val="bg1"/>
+        </a:solidFill>
+        <a:effectLst/>
+      </p:bgPr>
+    </p:bg>
+    <p:spTree>
+      <p:nvGrpSpPr>
+        <p:cNvPr id="1" name=""/>
+        <p:cNvGrpSpPr/>
+        <p:nvPr/>
+      </p:nvGrpSpPr>
+      <p:grpSpPr>
+        <a:xfrm>
+          <a:off x="0" y="0"/>
+          <a:ext cx="0" cy="0"/>
+          <a:chOff x="0" y="0"/>
+          <a:chExt cx="0" cy="0"/>
+        </a:xfrm>
+      </p:grpSpPr>
+      <p:sp>
+        <p:nvSpPr>
+          <p:cNvPr id="10" name="Rectangle 9">
+            <a:extLst>
+              <a:ext uri="{FF2B5EF4-FFF2-40B4-BE49-F238E27FC236}">
+                <a16:creationId xmlns:a16="http://schemas.microsoft.com/office/drawing/2014/main" id="{42A4FC2C-047E-45A5-965D-8E1E3BF09BC6}"/>
+              </a:ext>
+              <a:ext uri="{C183D7F6-B498-43B3-948B-1728B52AA6E4}">
+                <adec:decorative xmlns:adec="http://schemas.microsoft.com/office/drawing/2017/decorative" val="1"/>
+              </a:ext>
+            </a:extLst>
+          </p:cNvPr>
+          <p:cNvSpPr>
+            <a:spLocks noGrp="1" noRot="1" noChangeAspect="1" noMove="1" noResize="1" noEditPoints="1" noAdjustHandles="1" noChangeArrowheads="1" noChangeShapeType="1" noTextEdit="1"/>
+          </p:cNvSpPr>
+          <p:nvPr>
+            <p:extLst>
+              <p:ext uri="{386F3935-93C4-4BCD-93E2-E3B085C9AB24}">
+                <p16:designElem xmlns:p16="http://schemas.microsoft.com/office/powerpoint/2015/main" val="1"/>
+              </p:ext>
+            </p:extLst>
+          </p:nvPr>
+        </p:nvSpPr>
+        <p:spPr bwMode="white">
+          <a:xfrm>
+            <a:off x="1143" y="0"/>
+            <a:ext cx="9141714" cy="6858000"/>
+          </a:xfrm>
+          <a:prstGeom prst="rect">
+            <a:avLst/>
+          </a:prstGeom>
+          <a:noFill/>
+          <a:ln>
+            <a:noFill/>
+          </a:ln>
+        </p:spPr>
+        <p:style>
+          <a:lnRef idx="2">
+            <a:schemeClr val="accent1">
+              <a:shade val="50000"/>
+            </a:schemeClr>
+          </a:lnRef>
+          <a:fillRef idx="1">
+            <a:schemeClr val="accent1"/>
+          </a:fillRef>
+          <a:effectRef idx="0">
+            <a:schemeClr val="accent1"/>
+          </a:effectRef>
+          <a:fontRef idx="minor">
+            <a:schemeClr val="lt1"/>
+          </a:fontRef>
+        </p:style>
+        <p:txBody>
+          <a:bodyPr rtlCol="0" anchor="ctr"/>
+          <a:lstStyle>
+            <a:defPPr>
+              <a:defRPr lang="en-US"/>
+            </a:defPPr>
+            <a:lvl1pPr marL="0" algn="l" defTabSz="914400" rtl="0" eaLnBrk="1" latinLnBrk="0" hangingPunct="1">
+              <a:defRPr sz="1800" kern="1200">
+                <a:solidFill>
+                  <a:schemeClr val="lt1"/>
+                </a:solidFill>
+                <a:latin typeface="+mn-lt"/>
+                <a:ea typeface="+mn-ea"/>
+                <a:cs typeface="+mn-cs"/>
+              </a:defRPr>
+            </a:lvl1pPr>
+            <a:lvl2pPr marL="457200" algn="l" defTabSz="914400" rtl="0" eaLnBrk="1" latinLnBrk="0" hangingPunct="1">
+              <a:defRPr sz="1800" kern="1200">
+                <a:solidFill>
+                  <a:schemeClr val="lt1"/>
+                </a:solidFill>
+                <a:latin typeface="+mn-lt"/>
+                <a:ea typeface="+mn-ea"/>
+                <a:cs typeface="+mn-cs"/>
+              </a:defRPr>
+            </a:lvl2pPr>
+            <a:lvl3pPr marL="914400" algn="l" defTabSz="914400" rtl="0" eaLnBrk="1" latinLnBrk="0" hangingPunct="1">
+              <a:defRPr sz="1800" kern="1200">
+                <a:solidFill>
+                  <a:schemeClr val="lt1"/>
+                </a:solidFill>
+                <a:latin typeface="+mn-lt"/>
+                <a:ea typeface="+mn-ea"/>
+                <a:cs typeface="+mn-cs"/>
+              </a:defRPr>
+            </a:lvl3pPr>
+            <a:lvl4pPr marL="1371600" algn="l" defTabSz="914400" rtl="0" eaLnBrk="1" latinLnBrk="0" hangingPunct="1">
+              <a:defRPr sz="1800" kern="1200">
+                <a:solidFill>
+                  <a:schemeClr val="lt1"/>
+                </a:solidFill>
+                <a:latin typeface="+mn-lt"/>
+                <a:ea typeface="+mn-ea"/>
+                <a:cs typeface="+mn-cs"/>
+              </a:defRPr>
+            </a:lvl4pPr>
+            <a:lvl5pPr marL="1828800" algn="l" defTabSz="914400" rtl="0" eaLnBrk="1" latinLnBrk="0" hangingPunct="1">
+              <a:defRPr sz="1800" kern="1200">
+                <a:solidFill>
+                  <a:schemeClr val="lt1"/>
+                </a:solidFill>
+                <a:latin typeface="+mn-lt"/>
+                <a:ea typeface="+mn-ea"/>
+                <a:cs typeface="+mn-cs"/>
+              </a:defRPr>
+            </a:lvl5pPr>
+            <a:lvl6pPr marL="2286000" algn="l" defTabSz="914400" rtl="0" eaLnBrk="1" latinLnBrk="0" hangingPunct="1">
+              <a:defRPr sz="1800" kern="1200">
+                <a:solidFill>
+                  <a:schemeClr val="lt1"/>
+                </a:solidFill>
+                <a:latin typeface="+mn-lt"/>
+                <a:ea typeface="+mn-ea"/>
+                <a:cs typeface="+mn-cs"/>
+              </a:defRPr>
+            </a:lvl6pPr>
+            <a:lvl7pPr marL="2743200" algn="l" defTabSz="914400" rtl="0" eaLnBrk="1" latinLnBrk="0" hangingPunct="1">
+              <a:defRPr sz="1800" kern="1200">
+                <a:solidFill>
+                  <a:schemeClr val="lt1"/>
+                </a:solidFill>
+                <a:latin typeface="+mn-lt"/>
+                <a:ea typeface="+mn-ea"/>
+                <a:cs typeface="+mn-cs"/>
+              </a:defRPr>
+            </a:lvl7pPr>
+            <a:lvl8pPr marL="3200400" algn="l" defTabSz="914400" rtl="0" eaLnBrk="1" latinLnBrk="0" hangingPunct="1">
+              <a:defRPr sz="1800" kern="1200">
+                <a:solidFill>
+                  <a:schemeClr val="lt1"/>
+                </a:solidFill>
+                <a:latin typeface="+mn-lt"/>
+                <a:ea typeface="+mn-ea"/>
+                <a:cs typeface="+mn-cs"/>
+              </a:defRPr>
+            </a:lvl8pPr>
+            <a:lvl9pPr marL="3657600" algn="l" defTabSz="914400" rtl="0" eaLnBrk="1" latinLnBrk="0" hangingPunct="1">
+              <a:defRPr sz="1800" kern="1200">
+                <a:solidFill>
+                  <a:schemeClr val="lt1"/>
+                </a:solidFill>
+                <a:latin typeface="+mn-lt"/>
+                <a:ea typeface="+mn-ea"/>
+                <a:cs typeface="+mn-cs"/>
+              </a:defRPr>
+            </a:lvl9pPr>
+          </a:lstStyle>
+          <a:p>
+            <a:pPr algn="ctr"/>
+            <a:endParaRPr lang="en-US"/>
+          </a:p>
+        </p:txBody>
+      </p:sp>
+      <p:pic>
+        <p:nvPicPr>
+          <p:cNvPr id="5" name="Content Placeholder 4" descr="A screenshot of a login page">
+            <a:extLst>
+              <a:ext uri="{FF2B5EF4-FFF2-40B4-BE49-F238E27FC236}">
+                <a16:creationId xmlns:a16="http://schemas.microsoft.com/office/drawing/2014/main" id="{C43C0535-5C5A-90F9-8F14-B29EDFB8A1E7}"/>
+              </a:ext>
+            </a:extLst>
+          </p:cNvPr>
+          <p:cNvPicPr>
+            <a:picLocks noGrp="1" noChangeAspect="1"/>
+          </p:cNvPicPr>
+          <p:nvPr>
+            <p:ph idx="1"/>
+          </p:nvPr>
+        </p:nvPicPr>
+        <p:blipFill>
+          <a:blip r:embed="rId2"/>
+          <a:srcRect r="5314" b="-2"/>
+          <a:stretch>
+            <a:fillRect/>
+          </a:stretch>
+        </p:blipFill>
+        <p:spPr>
+          <a:xfrm>
+            <a:off x="20" y="11010"/>
+            <a:ext cx="9143980" cy="6856718"/>
+          </a:xfrm>
+          <a:prstGeom prst="rect">
+            <a:avLst/>
+          </a:prstGeom>
+        </p:spPr>
+      </p:pic>
+    </p:spTree>
+    <p:extLst>
+      <p:ext uri="{BB962C8B-B14F-4D97-AF65-F5344CB8AC3E}">
+        <p14:creationId xmlns:p14="http://schemas.microsoft.com/office/powerpoint/2010/main" val="3915818407"/>
+      </p:ext>
+    </p:extLst>
+  </p:cSld>
+  <p:clrMapOvr>
+    <a:masterClrMapping/>
+  </p:clrMapOvr>
+</p:sld>
+</file>
+
+<file path=ppt/slides/slide29.xml><?xml version="1.0" encoding="utf-8"?>
 <p:sld xmlns:a="http://schemas.openxmlformats.org/drawingml/2006/main" xmlns:r="http://schemas.openxmlformats.org/officeDocument/2006/relationships" xmlns:p="http://schemas.openxmlformats.org/presentationml/2006/main">
   <p:cSld>
     <p:bg>
@@ -17713,7 +18080,546 @@
 </p:sld>
 </file>
 
-<file path=ppt/slides/slide28.xml><?xml version="1.0" encoding="utf-8"?>
+<file path=ppt/slides/slide3.xml><?xml version="1.0" encoding="utf-8"?>
+<p:sld xmlns:a="http://schemas.openxmlformats.org/drawingml/2006/main" xmlns:r="http://schemas.openxmlformats.org/officeDocument/2006/relationships" xmlns:p="http://schemas.openxmlformats.org/presentationml/2006/main">
+  <p:cSld>
+    <p:bg>
+      <p:bgPr>
+        <a:solidFill>
+          <a:schemeClr val="bg1"/>
+        </a:solidFill>
+        <a:effectLst/>
+      </p:bgPr>
+    </p:bg>
+    <p:spTree>
+      <p:nvGrpSpPr>
+        <p:cNvPr id="1" name=""/>
+        <p:cNvGrpSpPr/>
+        <p:nvPr/>
+      </p:nvGrpSpPr>
+      <p:grpSpPr>
+        <a:xfrm>
+          <a:off x="0" y="0"/>
+          <a:ext cx="0" cy="0"/>
+          <a:chOff x="0" y="0"/>
+          <a:chExt cx="0" cy="0"/>
+        </a:xfrm>
+      </p:grpSpPr>
+      <p:sp>
+        <p:nvSpPr>
+          <p:cNvPr id="20" name="Rectangle 19">
+            <a:extLst>
+              <a:ext uri="{FF2B5EF4-FFF2-40B4-BE49-F238E27FC236}">
+                <a16:creationId xmlns:a16="http://schemas.microsoft.com/office/drawing/2014/main" id="{B250C39F-3F6C-4D53-86D2-7BC6B2FF609C}"/>
+              </a:ext>
+              <a:ext uri="{C183D7F6-B498-43B3-948B-1728B52AA6E4}">
+                <adec:decorative xmlns:adec="http://schemas.microsoft.com/office/drawing/2017/decorative" val="1"/>
+              </a:ext>
+            </a:extLst>
+          </p:cNvPr>
+          <p:cNvSpPr>
+            <a:spLocks noGrp="1" noRot="1" noChangeAspect="1" noMove="1" noResize="1" noEditPoints="1" noAdjustHandles="1" noChangeArrowheads="1" noChangeShapeType="1" noTextEdit="1"/>
+          </p:cNvSpPr>
+          <p:nvPr>
+            <p:extLst>
+              <p:ext uri="{386F3935-93C4-4BCD-93E2-E3B085C9AB24}">
+                <p16:designElem xmlns:p16="http://schemas.microsoft.com/office/powerpoint/2015/main" val="1"/>
+              </p:ext>
+            </p:extLst>
+          </p:nvPr>
+        </p:nvSpPr>
+        <p:spPr>
+          <a:xfrm>
+            <a:off x="0" y="0"/>
+            <a:ext cx="9144000" cy="6858000"/>
+          </a:xfrm>
+          <a:prstGeom prst="rect">
+            <a:avLst/>
+          </a:prstGeom>
+          <a:solidFill>
+            <a:schemeClr val="tx1">
+              <a:lumMod val="95000"/>
+              <a:lumOff val="5000"/>
+            </a:schemeClr>
+          </a:solidFill>
+          <a:ln>
+            <a:noFill/>
+          </a:ln>
+        </p:spPr>
+        <p:style>
+          <a:lnRef idx="2">
+            <a:schemeClr val="accent1">
+              <a:shade val="50000"/>
+            </a:schemeClr>
+          </a:lnRef>
+          <a:fillRef idx="1">
+            <a:schemeClr val="accent1"/>
+          </a:fillRef>
+          <a:effectRef idx="0">
+            <a:schemeClr val="accent1"/>
+          </a:effectRef>
+          <a:fontRef idx="minor">
+            <a:schemeClr val="lt1"/>
+          </a:fontRef>
+        </p:style>
+        <p:txBody>
+          <a:bodyPr rtlCol="0" anchor="ctr"/>
+          <a:lstStyle/>
+          <a:p>
+            <a:pPr algn="ctr"/>
+            <a:endParaRPr lang="en-US" dirty="0"/>
+          </a:p>
+        </p:txBody>
+      </p:sp>
+      <p:pic>
+        <p:nvPicPr>
+          <p:cNvPr id="15" name="Picture 14" descr="Boxes On Rack In Warehouse">
+            <a:extLst>
+              <a:ext uri="{FF2B5EF4-FFF2-40B4-BE49-F238E27FC236}">
+                <a16:creationId xmlns:a16="http://schemas.microsoft.com/office/drawing/2014/main" id="{98F32FF1-19A9-F6C1-4714-BCD29F723F3B}"/>
+              </a:ext>
+            </a:extLst>
+          </p:cNvPr>
+          <p:cNvPicPr>
+            <a:picLocks noChangeAspect="1"/>
+          </p:cNvPicPr>
+          <p:nvPr/>
+        </p:nvPicPr>
+        <p:blipFill>
+          <a:blip r:embed="rId2"/>
+          <a:srcRect l="10249" r="750" b="-1"/>
+          <a:stretch>
+            <a:fillRect/>
+          </a:stretch>
+        </p:blipFill>
+        <p:spPr>
+          <a:xfrm>
+            <a:off x="20" y="10"/>
+            <a:ext cx="9143980" cy="6857990"/>
+          </a:xfrm>
+          <a:prstGeom prst="rect">
+            <a:avLst/>
+          </a:prstGeom>
+        </p:spPr>
+      </p:pic>
+      <p:sp>
+        <p:nvSpPr>
+          <p:cNvPr id="22" name="Rectangle 21">
+            <a:extLst>
+              <a:ext uri="{FF2B5EF4-FFF2-40B4-BE49-F238E27FC236}">
+                <a16:creationId xmlns:a16="http://schemas.microsoft.com/office/drawing/2014/main" id="{70A48D59-8581-41F7-B529-F4617FE07A9A}"/>
+              </a:ext>
+              <a:ext uri="{C183D7F6-B498-43B3-948B-1728B52AA6E4}">
+                <adec:decorative xmlns:adec="http://schemas.microsoft.com/office/drawing/2017/decorative" val="1"/>
+              </a:ext>
+            </a:extLst>
+          </p:cNvPr>
+          <p:cNvSpPr>
+            <a:spLocks noGrp="1" noRot="1" noChangeAspect="1" noMove="1" noResize="1" noEditPoints="1" noAdjustHandles="1" noChangeArrowheads="1" noChangeShapeType="1" noTextEdit="1"/>
+          </p:cNvSpPr>
+          <p:nvPr>
+            <p:extLst>
+              <p:ext uri="{386F3935-93C4-4BCD-93E2-E3B085C9AB24}">
+                <p16:designElem xmlns:p16="http://schemas.microsoft.com/office/powerpoint/2015/main" val="1"/>
+              </p:ext>
+            </p:extLst>
+          </p:nvPr>
+        </p:nvSpPr>
+        <p:spPr>
+          <a:xfrm>
+            <a:off x="0" y="0"/>
+            <a:ext cx="9144000" cy="6858000"/>
+          </a:xfrm>
+          <a:prstGeom prst="rect">
+            <a:avLst/>
+          </a:prstGeom>
+          <a:gradFill>
+            <a:gsLst>
+              <a:gs pos="46000">
+                <a:schemeClr val="tx1">
+                  <a:lumMod val="95000"/>
+                  <a:lumOff val="5000"/>
+                </a:schemeClr>
+              </a:gs>
+              <a:gs pos="90000">
+                <a:schemeClr val="tx1">
+                  <a:lumMod val="95000"/>
+                  <a:lumOff val="5000"/>
+                  <a:alpha val="0"/>
+                </a:schemeClr>
+              </a:gs>
+            </a:gsLst>
+            <a:lin ang="0" scaled="0"/>
+          </a:gradFill>
+          <a:ln>
+            <a:noFill/>
+          </a:ln>
+        </p:spPr>
+        <p:style>
+          <a:lnRef idx="2">
+            <a:schemeClr val="accent1">
+              <a:shade val="50000"/>
+            </a:schemeClr>
+          </a:lnRef>
+          <a:fillRef idx="1">
+            <a:schemeClr val="accent1"/>
+          </a:fillRef>
+          <a:effectRef idx="0">
+            <a:schemeClr val="accent1"/>
+          </a:effectRef>
+          <a:fontRef idx="minor">
+            <a:schemeClr val="lt1"/>
+          </a:fontRef>
+        </p:style>
+        <p:txBody>
+          <a:bodyPr rtlCol="0" anchor="ctr"/>
+          <a:lstStyle/>
+          <a:p>
+            <a:pPr algn="ctr"/>
+            <a:endParaRPr lang="en-US"/>
+          </a:p>
+        </p:txBody>
+      </p:sp>
+      <p:sp>
+        <p:nvSpPr>
+          <p:cNvPr id="2" name="Title 1"/>
+          <p:cNvSpPr>
+            <a:spLocks noGrp="1"/>
+          </p:cNvSpPr>
+          <p:nvPr>
+            <p:ph type="title"/>
+          </p:nvPr>
+        </p:nvSpPr>
+        <p:spPr>
+          <a:xfrm>
+            <a:off x="828675" y="910431"/>
+            <a:ext cx="3543300" cy="1466455"/>
+          </a:xfrm>
+        </p:spPr>
+        <p:txBody>
+          <a:bodyPr anchor="b">
+            <a:normAutofit/>
+          </a:bodyPr>
+          <a:lstStyle/>
+          <a:p>
+            <a:pPr>
+              <a:lnSpc>
+                <a:spcPct val="90000"/>
+              </a:lnSpc>
+            </a:pPr>
+            <a:r>
+              <a:rPr lang="en-US" sz="3700" dirty="0">
+                <a:solidFill>
+                  <a:schemeClr val="bg1"/>
+                </a:solidFill>
+              </a:rPr>
+              <a:t>Product Backlog (Product Owner)</a:t>
+            </a:r>
+          </a:p>
+        </p:txBody>
+      </p:sp>
+      <p:sp>
+        <p:nvSpPr>
+          <p:cNvPr id="3" name="Content Placeholder 2"/>
+          <p:cNvSpPr>
+            <a:spLocks noGrp="1"/>
+          </p:cNvSpPr>
+          <p:nvPr>
+            <p:ph idx="1"/>
+          </p:nvPr>
+        </p:nvSpPr>
+        <p:spPr>
+          <a:xfrm>
+            <a:off x="828675" y="2492080"/>
+            <a:ext cx="3543300" cy="3015849"/>
+          </a:xfrm>
+        </p:spPr>
+        <p:txBody>
+          <a:bodyPr>
+            <a:normAutofit/>
+          </a:bodyPr>
+          <a:lstStyle/>
+          <a:p>
+            <a:pPr lvl="0">
+              <a:lnSpc>
+                <a:spcPct val="90000"/>
+              </a:lnSpc>
+            </a:pPr>
+            <a:r>
+              <a:rPr lang="en-US" sz="1300">
+                <a:solidFill>
+                  <a:schemeClr val="bg1"/>
+                </a:solidFill>
+              </a:rPr>
+              <a:t>US1: Sign Up (Must)</a:t>
+            </a:r>
+          </a:p>
+          <a:p>
+            <a:pPr lvl="0">
+              <a:lnSpc>
+                <a:spcPct val="90000"/>
+              </a:lnSpc>
+            </a:pPr>
+            <a:r>
+              <a:rPr lang="en-US" sz="1300">
+                <a:solidFill>
+                  <a:schemeClr val="bg1"/>
+                </a:solidFill>
+              </a:rPr>
+              <a:t>US2: Login (Must)</a:t>
+            </a:r>
+          </a:p>
+          <a:p>
+            <a:pPr lvl="0">
+              <a:lnSpc>
+                <a:spcPct val="90000"/>
+              </a:lnSpc>
+            </a:pPr>
+            <a:r>
+              <a:rPr lang="en-US" sz="1300">
+                <a:solidFill>
+                  <a:schemeClr val="bg1"/>
+                </a:solidFill>
+              </a:rPr>
+              <a:t>US3: Browse Products (Must)</a:t>
+            </a:r>
+          </a:p>
+          <a:p>
+            <a:pPr lvl="0">
+              <a:lnSpc>
+                <a:spcPct val="90000"/>
+              </a:lnSpc>
+            </a:pPr>
+            <a:r>
+              <a:rPr lang="en-US" sz="1300">
+                <a:solidFill>
+                  <a:schemeClr val="bg1"/>
+                </a:solidFill>
+              </a:rPr>
+              <a:t>US4: Add to Cart (Must)</a:t>
+            </a:r>
+          </a:p>
+          <a:p>
+            <a:pPr lvl="0">
+              <a:lnSpc>
+                <a:spcPct val="90000"/>
+              </a:lnSpc>
+            </a:pPr>
+            <a:r>
+              <a:rPr lang="en-US" sz="1300">
+                <a:solidFill>
+                  <a:schemeClr val="bg1"/>
+                </a:solidFill>
+              </a:rPr>
+              <a:t>US5: Search Products (Should)</a:t>
+            </a:r>
+          </a:p>
+          <a:p>
+            <a:pPr lvl="0">
+              <a:lnSpc>
+                <a:spcPct val="90000"/>
+              </a:lnSpc>
+            </a:pPr>
+            <a:r>
+              <a:rPr lang="en-US" sz="1300">
+                <a:solidFill>
+                  <a:schemeClr val="bg1"/>
+                </a:solidFill>
+              </a:rPr>
+              <a:t>US6: Checkout (Must)</a:t>
+            </a:r>
+          </a:p>
+          <a:p>
+            <a:pPr lvl="0">
+              <a:lnSpc>
+                <a:spcPct val="90000"/>
+              </a:lnSpc>
+            </a:pPr>
+            <a:r>
+              <a:rPr lang="en-US" sz="1300">
+                <a:solidFill>
+                  <a:schemeClr val="bg1"/>
+                </a:solidFill>
+              </a:rPr>
+              <a:t>US7: Track Orders (Should)</a:t>
+            </a:r>
+          </a:p>
+          <a:p>
+            <a:pPr lvl="0">
+              <a:lnSpc>
+                <a:spcPct val="90000"/>
+              </a:lnSpc>
+            </a:pPr>
+            <a:r>
+              <a:rPr lang="en-US" sz="1300">
+                <a:solidFill>
+                  <a:schemeClr val="bg1"/>
+                </a:solidFill>
+              </a:rPr>
+              <a:t>US8: Wishlist (Could)</a:t>
+            </a:r>
+          </a:p>
+          <a:p>
+            <a:pPr lvl="0">
+              <a:lnSpc>
+                <a:spcPct val="90000"/>
+              </a:lnSpc>
+            </a:pPr>
+            <a:r>
+              <a:rPr lang="en-US" sz="1300">
+                <a:solidFill>
+                  <a:schemeClr val="bg1"/>
+                </a:solidFill>
+              </a:rPr>
+              <a:t>US9: Review Products (Could)</a:t>
+            </a:r>
+          </a:p>
+          <a:p>
+            <a:pPr lvl="0">
+              <a:lnSpc>
+                <a:spcPct val="90000"/>
+              </a:lnSpc>
+            </a:pPr>
+            <a:r>
+              <a:rPr lang="en-US" sz="1300">
+                <a:solidFill>
+                  <a:schemeClr val="bg1"/>
+                </a:solidFill>
+              </a:rPr>
+              <a:t>US10: Admin – Add Products (Must)</a:t>
+            </a:r>
+          </a:p>
+          <a:p>
+            <a:pPr lvl="0">
+              <a:lnSpc>
+                <a:spcPct val="90000"/>
+              </a:lnSpc>
+            </a:pPr>
+            <a:r>
+              <a:rPr lang="en-US" sz="1300">
+                <a:solidFill>
+                  <a:schemeClr val="bg1"/>
+                </a:solidFill>
+              </a:rPr>
+              <a:t>US11: Admin – Edit Products (Must)</a:t>
+            </a:r>
+          </a:p>
+          <a:p>
+            <a:pPr lvl="0">
+              <a:lnSpc>
+                <a:spcPct val="90000"/>
+              </a:lnSpc>
+            </a:pPr>
+            <a:r>
+              <a:rPr lang="en-US" sz="1300">
+                <a:solidFill>
+                  <a:schemeClr val="bg1"/>
+                </a:solidFill>
+              </a:rPr>
+              <a:t>US12: Admin – Delete Products (Must)</a:t>
+            </a:r>
+          </a:p>
+          <a:p>
+            <a:pPr lvl="0">
+              <a:lnSpc>
+                <a:spcPct val="90000"/>
+              </a:lnSpc>
+            </a:pPr>
+            <a:r>
+              <a:rPr lang="en-US" sz="1300">
+                <a:solidFill>
+                  <a:schemeClr val="bg1"/>
+                </a:solidFill>
+              </a:rPr>
+              <a:t>US13: Admin – View Sales Reports (Should)</a:t>
+            </a:r>
+          </a:p>
+          <a:p>
+            <a:pPr>
+              <a:lnSpc>
+                <a:spcPct val="90000"/>
+              </a:lnSpc>
+            </a:pPr>
+            <a:endParaRPr lang="en-US" sz="1300">
+              <a:solidFill>
+                <a:schemeClr val="bg1"/>
+              </a:solidFill>
+            </a:endParaRPr>
+          </a:p>
+        </p:txBody>
+      </p:sp>
+      <p:sp>
+        <p:nvSpPr>
+          <p:cNvPr id="24" name="Rectangle 23">
+            <a:extLst>
+              <a:ext uri="{FF2B5EF4-FFF2-40B4-BE49-F238E27FC236}">
+                <a16:creationId xmlns:a16="http://schemas.microsoft.com/office/drawing/2014/main" id="{9DD005C1-8C51-42D6-9BEE-B9B83849743D}"/>
+              </a:ext>
+              <a:ext uri="{C183D7F6-B498-43B3-948B-1728B52AA6E4}">
+                <adec:decorative xmlns:adec="http://schemas.microsoft.com/office/drawing/2017/decorative" val="1"/>
+              </a:ext>
+            </a:extLst>
+          </p:cNvPr>
+          <p:cNvSpPr>
+            <a:spLocks noGrp="1" noRot="1" noChangeAspect="1" noMove="1" noResize="1" noEditPoints="1" noAdjustHandles="1" noChangeArrowheads="1" noChangeShapeType="1" noTextEdit="1"/>
+          </p:cNvSpPr>
+          <p:nvPr>
+            <p:extLst>
+              <p:ext uri="{386F3935-93C4-4BCD-93E2-E3B085C9AB24}">
+                <p16:designElem xmlns:p16="http://schemas.microsoft.com/office/powerpoint/2015/main" val="1"/>
+              </p:ext>
+            </p:extLst>
+          </p:nvPr>
+        </p:nvSpPr>
+        <p:spPr>
+          <a:xfrm>
+            <a:off x="94654" y="115193"/>
+            <a:ext cx="8954691" cy="6627614"/>
+          </a:xfrm>
+          <a:prstGeom prst="rect">
+            <a:avLst/>
+          </a:prstGeom>
+          <a:noFill/>
+          <a:ln w="12700">
+            <a:solidFill>
+              <a:schemeClr val="accent2"/>
+            </a:solidFill>
+          </a:ln>
+        </p:spPr>
+        <p:style>
+          <a:lnRef idx="2">
+            <a:schemeClr val="accent1">
+              <a:shade val="50000"/>
+            </a:schemeClr>
+          </a:lnRef>
+          <a:fillRef idx="1">
+            <a:schemeClr val="accent1"/>
+          </a:fillRef>
+          <a:effectRef idx="0">
+            <a:schemeClr val="accent1"/>
+          </a:effectRef>
+          <a:fontRef idx="minor">
+            <a:schemeClr val="lt1"/>
+          </a:fontRef>
+        </p:style>
+        <p:txBody>
+          <a:bodyPr rtlCol="0" anchor="ctr"/>
+          <a:lstStyle/>
+          <a:p>
+            <a:pPr algn="ctr"/>
+            <a:endParaRPr lang="en-US"/>
+          </a:p>
+        </p:txBody>
+      </p:sp>
+    </p:spTree>
+  </p:cSld>
+  <p:clrMapOvr>
+    <a:masterClrMapping/>
+  </p:clrMapOvr>
+</p:sld>
+</file>
+
+<file path=ppt/slides/slide30.xml><?xml version="1.0" encoding="utf-8"?>
 <p:sld xmlns:a="http://schemas.openxmlformats.org/drawingml/2006/main" xmlns:r="http://schemas.openxmlformats.org/officeDocument/2006/relationships" xmlns:p="http://schemas.openxmlformats.org/presentationml/2006/main">
   <p:cSld>
     <p:bg>
@@ -18106,7 +19012,7 @@
 </p:sld>
 </file>
 
-<file path=ppt/slides/slide29.xml><?xml version="1.0" encoding="utf-8"?>
+<file path=ppt/slides/slide31.xml><?xml version="1.0" encoding="utf-8"?>
 <p:sld xmlns:a="http://schemas.openxmlformats.org/drawingml/2006/main" xmlns:r="http://schemas.openxmlformats.org/officeDocument/2006/relationships" xmlns:p="http://schemas.openxmlformats.org/presentationml/2006/main">
   <p:cSld>
     <p:bg>
@@ -18541,546 +19447,7 @@
 </p:sld>
 </file>
 
-<file path=ppt/slides/slide3.xml><?xml version="1.0" encoding="utf-8"?>
-<p:sld xmlns:a="http://schemas.openxmlformats.org/drawingml/2006/main" xmlns:r="http://schemas.openxmlformats.org/officeDocument/2006/relationships" xmlns:p="http://schemas.openxmlformats.org/presentationml/2006/main">
-  <p:cSld>
-    <p:bg>
-      <p:bgPr>
-        <a:solidFill>
-          <a:schemeClr val="bg1"/>
-        </a:solidFill>
-        <a:effectLst/>
-      </p:bgPr>
-    </p:bg>
-    <p:spTree>
-      <p:nvGrpSpPr>
-        <p:cNvPr id="1" name=""/>
-        <p:cNvGrpSpPr/>
-        <p:nvPr/>
-      </p:nvGrpSpPr>
-      <p:grpSpPr>
-        <a:xfrm>
-          <a:off x="0" y="0"/>
-          <a:ext cx="0" cy="0"/>
-          <a:chOff x="0" y="0"/>
-          <a:chExt cx="0" cy="0"/>
-        </a:xfrm>
-      </p:grpSpPr>
-      <p:sp>
-        <p:nvSpPr>
-          <p:cNvPr id="20" name="Rectangle 19">
-            <a:extLst>
-              <a:ext uri="{FF2B5EF4-FFF2-40B4-BE49-F238E27FC236}">
-                <a16:creationId xmlns:a16="http://schemas.microsoft.com/office/drawing/2014/main" id="{B250C39F-3F6C-4D53-86D2-7BC6B2FF609C}"/>
-              </a:ext>
-              <a:ext uri="{C183D7F6-B498-43B3-948B-1728B52AA6E4}">
-                <adec:decorative xmlns:adec="http://schemas.microsoft.com/office/drawing/2017/decorative" val="1"/>
-              </a:ext>
-            </a:extLst>
-          </p:cNvPr>
-          <p:cNvSpPr>
-            <a:spLocks noGrp="1" noRot="1" noChangeAspect="1" noMove="1" noResize="1" noEditPoints="1" noAdjustHandles="1" noChangeArrowheads="1" noChangeShapeType="1" noTextEdit="1"/>
-          </p:cNvSpPr>
-          <p:nvPr>
-            <p:extLst>
-              <p:ext uri="{386F3935-93C4-4BCD-93E2-E3B085C9AB24}">
-                <p16:designElem xmlns:p16="http://schemas.microsoft.com/office/powerpoint/2015/main" val="1"/>
-              </p:ext>
-            </p:extLst>
-          </p:nvPr>
-        </p:nvSpPr>
-        <p:spPr>
-          <a:xfrm>
-            <a:off x="0" y="0"/>
-            <a:ext cx="9144000" cy="6858000"/>
-          </a:xfrm>
-          <a:prstGeom prst="rect">
-            <a:avLst/>
-          </a:prstGeom>
-          <a:solidFill>
-            <a:schemeClr val="tx1">
-              <a:lumMod val="95000"/>
-              <a:lumOff val="5000"/>
-            </a:schemeClr>
-          </a:solidFill>
-          <a:ln>
-            <a:noFill/>
-          </a:ln>
-        </p:spPr>
-        <p:style>
-          <a:lnRef idx="2">
-            <a:schemeClr val="accent1">
-              <a:shade val="50000"/>
-            </a:schemeClr>
-          </a:lnRef>
-          <a:fillRef idx="1">
-            <a:schemeClr val="accent1"/>
-          </a:fillRef>
-          <a:effectRef idx="0">
-            <a:schemeClr val="accent1"/>
-          </a:effectRef>
-          <a:fontRef idx="minor">
-            <a:schemeClr val="lt1"/>
-          </a:fontRef>
-        </p:style>
-        <p:txBody>
-          <a:bodyPr rtlCol="0" anchor="ctr"/>
-          <a:lstStyle/>
-          <a:p>
-            <a:pPr algn="ctr"/>
-            <a:endParaRPr lang="en-US" dirty="0"/>
-          </a:p>
-        </p:txBody>
-      </p:sp>
-      <p:pic>
-        <p:nvPicPr>
-          <p:cNvPr id="15" name="Picture 14" descr="Boxes On Rack In Warehouse">
-            <a:extLst>
-              <a:ext uri="{FF2B5EF4-FFF2-40B4-BE49-F238E27FC236}">
-                <a16:creationId xmlns:a16="http://schemas.microsoft.com/office/drawing/2014/main" id="{98F32FF1-19A9-F6C1-4714-BCD29F723F3B}"/>
-              </a:ext>
-            </a:extLst>
-          </p:cNvPr>
-          <p:cNvPicPr>
-            <a:picLocks noChangeAspect="1"/>
-          </p:cNvPicPr>
-          <p:nvPr/>
-        </p:nvPicPr>
-        <p:blipFill>
-          <a:blip r:embed="rId2"/>
-          <a:srcRect l="10249" r="750" b="-1"/>
-          <a:stretch>
-            <a:fillRect/>
-          </a:stretch>
-        </p:blipFill>
-        <p:spPr>
-          <a:xfrm>
-            <a:off x="20" y="10"/>
-            <a:ext cx="9143980" cy="6857990"/>
-          </a:xfrm>
-          <a:prstGeom prst="rect">
-            <a:avLst/>
-          </a:prstGeom>
-        </p:spPr>
-      </p:pic>
-      <p:sp>
-        <p:nvSpPr>
-          <p:cNvPr id="22" name="Rectangle 21">
-            <a:extLst>
-              <a:ext uri="{FF2B5EF4-FFF2-40B4-BE49-F238E27FC236}">
-                <a16:creationId xmlns:a16="http://schemas.microsoft.com/office/drawing/2014/main" id="{70A48D59-8581-41F7-B529-F4617FE07A9A}"/>
-              </a:ext>
-              <a:ext uri="{C183D7F6-B498-43B3-948B-1728B52AA6E4}">
-                <adec:decorative xmlns:adec="http://schemas.microsoft.com/office/drawing/2017/decorative" val="1"/>
-              </a:ext>
-            </a:extLst>
-          </p:cNvPr>
-          <p:cNvSpPr>
-            <a:spLocks noGrp="1" noRot="1" noChangeAspect="1" noMove="1" noResize="1" noEditPoints="1" noAdjustHandles="1" noChangeArrowheads="1" noChangeShapeType="1" noTextEdit="1"/>
-          </p:cNvSpPr>
-          <p:nvPr>
-            <p:extLst>
-              <p:ext uri="{386F3935-93C4-4BCD-93E2-E3B085C9AB24}">
-                <p16:designElem xmlns:p16="http://schemas.microsoft.com/office/powerpoint/2015/main" val="1"/>
-              </p:ext>
-            </p:extLst>
-          </p:nvPr>
-        </p:nvSpPr>
-        <p:spPr>
-          <a:xfrm>
-            <a:off x="0" y="0"/>
-            <a:ext cx="9144000" cy="6858000"/>
-          </a:xfrm>
-          <a:prstGeom prst="rect">
-            <a:avLst/>
-          </a:prstGeom>
-          <a:gradFill>
-            <a:gsLst>
-              <a:gs pos="46000">
-                <a:schemeClr val="tx1">
-                  <a:lumMod val="95000"/>
-                  <a:lumOff val="5000"/>
-                </a:schemeClr>
-              </a:gs>
-              <a:gs pos="90000">
-                <a:schemeClr val="tx1">
-                  <a:lumMod val="95000"/>
-                  <a:lumOff val="5000"/>
-                  <a:alpha val="0"/>
-                </a:schemeClr>
-              </a:gs>
-            </a:gsLst>
-            <a:lin ang="0" scaled="0"/>
-          </a:gradFill>
-          <a:ln>
-            <a:noFill/>
-          </a:ln>
-        </p:spPr>
-        <p:style>
-          <a:lnRef idx="2">
-            <a:schemeClr val="accent1">
-              <a:shade val="50000"/>
-            </a:schemeClr>
-          </a:lnRef>
-          <a:fillRef idx="1">
-            <a:schemeClr val="accent1"/>
-          </a:fillRef>
-          <a:effectRef idx="0">
-            <a:schemeClr val="accent1"/>
-          </a:effectRef>
-          <a:fontRef idx="minor">
-            <a:schemeClr val="lt1"/>
-          </a:fontRef>
-        </p:style>
-        <p:txBody>
-          <a:bodyPr rtlCol="0" anchor="ctr"/>
-          <a:lstStyle/>
-          <a:p>
-            <a:pPr algn="ctr"/>
-            <a:endParaRPr lang="en-US"/>
-          </a:p>
-        </p:txBody>
-      </p:sp>
-      <p:sp>
-        <p:nvSpPr>
-          <p:cNvPr id="2" name="Title 1"/>
-          <p:cNvSpPr>
-            <a:spLocks noGrp="1"/>
-          </p:cNvSpPr>
-          <p:nvPr>
-            <p:ph type="title"/>
-          </p:nvPr>
-        </p:nvSpPr>
-        <p:spPr>
-          <a:xfrm>
-            <a:off x="828675" y="910431"/>
-            <a:ext cx="3543300" cy="1466455"/>
-          </a:xfrm>
-        </p:spPr>
-        <p:txBody>
-          <a:bodyPr anchor="b">
-            <a:normAutofit/>
-          </a:bodyPr>
-          <a:lstStyle/>
-          <a:p>
-            <a:pPr>
-              <a:lnSpc>
-                <a:spcPct val="90000"/>
-              </a:lnSpc>
-            </a:pPr>
-            <a:r>
-              <a:rPr lang="en-US" sz="3700" dirty="0">
-                <a:solidFill>
-                  <a:schemeClr val="bg1"/>
-                </a:solidFill>
-              </a:rPr>
-              <a:t>Product Backlog (Product Owner)</a:t>
-            </a:r>
-          </a:p>
-        </p:txBody>
-      </p:sp>
-      <p:sp>
-        <p:nvSpPr>
-          <p:cNvPr id="3" name="Content Placeholder 2"/>
-          <p:cNvSpPr>
-            <a:spLocks noGrp="1"/>
-          </p:cNvSpPr>
-          <p:nvPr>
-            <p:ph idx="1"/>
-          </p:nvPr>
-        </p:nvSpPr>
-        <p:spPr>
-          <a:xfrm>
-            <a:off x="828675" y="2492080"/>
-            <a:ext cx="3543300" cy="3015849"/>
-          </a:xfrm>
-        </p:spPr>
-        <p:txBody>
-          <a:bodyPr>
-            <a:normAutofit/>
-          </a:bodyPr>
-          <a:lstStyle/>
-          <a:p>
-            <a:pPr lvl="0">
-              <a:lnSpc>
-                <a:spcPct val="90000"/>
-              </a:lnSpc>
-            </a:pPr>
-            <a:r>
-              <a:rPr lang="en-US" sz="1300">
-                <a:solidFill>
-                  <a:schemeClr val="bg1"/>
-                </a:solidFill>
-              </a:rPr>
-              <a:t>US1: Sign Up (Must)</a:t>
-            </a:r>
-          </a:p>
-          <a:p>
-            <a:pPr lvl="0">
-              <a:lnSpc>
-                <a:spcPct val="90000"/>
-              </a:lnSpc>
-            </a:pPr>
-            <a:r>
-              <a:rPr lang="en-US" sz="1300">
-                <a:solidFill>
-                  <a:schemeClr val="bg1"/>
-                </a:solidFill>
-              </a:rPr>
-              <a:t>US2: Login (Must)</a:t>
-            </a:r>
-          </a:p>
-          <a:p>
-            <a:pPr lvl="0">
-              <a:lnSpc>
-                <a:spcPct val="90000"/>
-              </a:lnSpc>
-            </a:pPr>
-            <a:r>
-              <a:rPr lang="en-US" sz="1300">
-                <a:solidFill>
-                  <a:schemeClr val="bg1"/>
-                </a:solidFill>
-              </a:rPr>
-              <a:t>US3: Browse Products (Must)</a:t>
-            </a:r>
-          </a:p>
-          <a:p>
-            <a:pPr lvl="0">
-              <a:lnSpc>
-                <a:spcPct val="90000"/>
-              </a:lnSpc>
-            </a:pPr>
-            <a:r>
-              <a:rPr lang="en-US" sz="1300">
-                <a:solidFill>
-                  <a:schemeClr val="bg1"/>
-                </a:solidFill>
-              </a:rPr>
-              <a:t>US4: Add to Cart (Must)</a:t>
-            </a:r>
-          </a:p>
-          <a:p>
-            <a:pPr lvl="0">
-              <a:lnSpc>
-                <a:spcPct val="90000"/>
-              </a:lnSpc>
-            </a:pPr>
-            <a:r>
-              <a:rPr lang="en-US" sz="1300">
-                <a:solidFill>
-                  <a:schemeClr val="bg1"/>
-                </a:solidFill>
-              </a:rPr>
-              <a:t>US5: Search Products (Should)</a:t>
-            </a:r>
-          </a:p>
-          <a:p>
-            <a:pPr lvl="0">
-              <a:lnSpc>
-                <a:spcPct val="90000"/>
-              </a:lnSpc>
-            </a:pPr>
-            <a:r>
-              <a:rPr lang="en-US" sz="1300">
-                <a:solidFill>
-                  <a:schemeClr val="bg1"/>
-                </a:solidFill>
-              </a:rPr>
-              <a:t>US6: Checkout (Must)</a:t>
-            </a:r>
-          </a:p>
-          <a:p>
-            <a:pPr lvl="0">
-              <a:lnSpc>
-                <a:spcPct val="90000"/>
-              </a:lnSpc>
-            </a:pPr>
-            <a:r>
-              <a:rPr lang="en-US" sz="1300">
-                <a:solidFill>
-                  <a:schemeClr val="bg1"/>
-                </a:solidFill>
-              </a:rPr>
-              <a:t>US7: Track Orders (Should)</a:t>
-            </a:r>
-          </a:p>
-          <a:p>
-            <a:pPr lvl="0">
-              <a:lnSpc>
-                <a:spcPct val="90000"/>
-              </a:lnSpc>
-            </a:pPr>
-            <a:r>
-              <a:rPr lang="en-US" sz="1300">
-                <a:solidFill>
-                  <a:schemeClr val="bg1"/>
-                </a:solidFill>
-              </a:rPr>
-              <a:t>US8: Wishlist (Could)</a:t>
-            </a:r>
-          </a:p>
-          <a:p>
-            <a:pPr lvl="0">
-              <a:lnSpc>
-                <a:spcPct val="90000"/>
-              </a:lnSpc>
-            </a:pPr>
-            <a:r>
-              <a:rPr lang="en-US" sz="1300">
-                <a:solidFill>
-                  <a:schemeClr val="bg1"/>
-                </a:solidFill>
-              </a:rPr>
-              <a:t>US9: Review Products (Could)</a:t>
-            </a:r>
-          </a:p>
-          <a:p>
-            <a:pPr lvl="0">
-              <a:lnSpc>
-                <a:spcPct val="90000"/>
-              </a:lnSpc>
-            </a:pPr>
-            <a:r>
-              <a:rPr lang="en-US" sz="1300">
-                <a:solidFill>
-                  <a:schemeClr val="bg1"/>
-                </a:solidFill>
-              </a:rPr>
-              <a:t>US10: Admin – Add Products (Must)</a:t>
-            </a:r>
-          </a:p>
-          <a:p>
-            <a:pPr lvl="0">
-              <a:lnSpc>
-                <a:spcPct val="90000"/>
-              </a:lnSpc>
-            </a:pPr>
-            <a:r>
-              <a:rPr lang="en-US" sz="1300">
-                <a:solidFill>
-                  <a:schemeClr val="bg1"/>
-                </a:solidFill>
-              </a:rPr>
-              <a:t>US11: Admin – Edit Products (Must)</a:t>
-            </a:r>
-          </a:p>
-          <a:p>
-            <a:pPr lvl="0">
-              <a:lnSpc>
-                <a:spcPct val="90000"/>
-              </a:lnSpc>
-            </a:pPr>
-            <a:r>
-              <a:rPr lang="en-US" sz="1300">
-                <a:solidFill>
-                  <a:schemeClr val="bg1"/>
-                </a:solidFill>
-              </a:rPr>
-              <a:t>US12: Admin – Delete Products (Must)</a:t>
-            </a:r>
-          </a:p>
-          <a:p>
-            <a:pPr lvl="0">
-              <a:lnSpc>
-                <a:spcPct val="90000"/>
-              </a:lnSpc>
-            </a:pPr>
-            <a:r>
-              <a:rPr lang="en-US" sz="1300">
-                <a:solidFill>
-                  <a:schemeClr val="bg1"/>
-                </a:solidFill>
-              </a:rPr>
-              <a:t>US13: Admin – View Sales Reports (Should)</a:t>
-            </a:r>
-          </a:p>
-          <a:p>
-            <a:pPr>
-              <a:lnSpc>
-                <a:spcPct val="90000"/>
-              </a:lnSpc>
-            </a:pPr>
-            <a:endParaRPr lang="en-US" sz="1300">
-              <a:solidFill>
-                <a:schemeClr val="bg1"/>
-              </a:solidFill>
-            </a:endParaRPr>
-          </a:p>
-        </p:txBody>
-      </p:sp>
-      <p:sp>
-        <p:nvSpPr>
-          <p:cNvPr id="24" name="Rectangle 23">
-            <a:extLst>
-              <a:ext uri="{FF2B5EF4-FFF2-40B4-BE49-F238E27FC236}">
-                <a16:creationId xmlns:a16="http://schemas.microsoft.com/office/drawing/2014/main" id="{9DD005C1-8C51-42D6-9BEE-B9B83849743D}"/>
-              </a:ext>
-              <a:ext uri="{C183D7F6-B498-43B3-948B-1728B52AA6E4}">
-                <adec:decorative xmlns:adec="http://schemas.microsoft.com/office/drawing/2017/decorative" val="1"/>
-              </a:ext>
-            </a:extLst>
-          </p:cNvPr>
-          <p:cNvSpPr>
-            <a:spLocks noGrp="1" noRot="1" noChangeAspect="1" noMove="1" noResize="1" noEditPoints="1" noAdjustHandles="1" noChangeArrowheads="1" noChangeShapeType="1" noTextEdit="1"/>
-          </p:cNvSpPr>
-          <p:nvPr>
-            <p:extLst>
-              <p:ext uri="{386F3935-93C4-4BCD-93E2-E3B085C9AB24}">
-                <p16:designElem xmlns:p16="http://schemas.microsoft.com/office/powerpoint/2015/main" val="1"/>
-              </p:ext>
-            </p:extLst>
-          </p:nvPr>
-        </p:nvSpPr>
-        <p:spPr>
-          <a:xfrm>
-            <a:off x="94654" y="115193"/>
-            <a:ext cx="8954691" cy="6627614"/>
-          </a:xfrm>
-          <a:prstGeom prst="rect">
-            <a:avLst/>
-          </a:prstGeom>
-          <a:noFill/>
-          <a:ln w="12700">
-            <a:solidFill>
-              <a:schemeClr val="accent2"/>
-            </a:solidFill>
-          </a:ln>
-        </p:spPr>
-        <p:style>
-          <a:lnRef idx="2">
-            <a:schemeClr val="accent1">
-              <a:shade val="50000"/>
-            </a:schemeClr>
-          </a:lnRef>
-          <a:fillRef idx="1">
-            <a:schemeClr val="accent1"/>
-          </a:fillRef>
-          <a:effectRef idx="0">
-            <a:schemeClr val="accent1"/>
-          </a:effectRef>
-          <a:fontRef idx="minor">
-            <a:schemeClr val="lt1"/>
-          </a:fontRef>
-        </p:style>
-        <p:txBody>
-          <a:bodyPr rtlCol="0" anchor="ctr"/>
-          <a:lstStyle/>
-          <a:p>
-            <a:pPr algn="ctr"/>
-            <a:endParaRPr lang="en-US"/>
-          </a:p>
-        </p:txBody>
-      </p:sp>
-    </p:spTree>
-  </p:cSld>
-  <p:clrMapOvr>
-    <a:masterClrMapping/>
-  </p:clrMapOvr>
-</p:sld>
-</file>
-
-<file path=ppt/slides/slide30.xml><?xml version="1.0" encoding="utf-8"?>
+<file path=ppt/slides/slide32.xml><?xml version="1.0" encoding="utf-8"?>
 <p:sld xmlns:a="http://schemas.openxmlformats.org/drawingml/2006/main" xmlns:r="http://schemas.openxmlformats.org/officeDocument/2006/relationships" xmlns:p="http://schemas.openxmlformats.org/presentationml/2006/main">
   <p:cSld>
     <p:bg>
@@ -19500,7 +19867,7 @@
 </p:sld>
 </file>
 
-<file path=ppt/slides/slide31.xml><?xml version="1.0" encoding="utf-8"?>
+<file path=ppt/slides/slide33.xml><?xml version="1.0" encoding="utf-8"?>
 <p:sld xmlns:a="http://schemas.openxmlformats.org/drawingml/2006/main" xmlns:r="http://schemas.openxmlformats.org/officeDocument/2006/relationships" xmlns:p="http://schemas.openxmlformats.org/presentationml/2006/main">
   <p:cSld>
     <p:bg>
@@ -19935,7 +20302,249 @@
 </p:sld>
 </file>
 
-<file path=ppt/slides/slide32.xml><?xml version="1.0" encoding="utf-8"?>
+<file path=ppt/slides/slide34.xml><?xml version="1.0" encoding="utf-8"?>
+<p:sld xmlns:a="http://schemas.openxmlformats.org/drawingml/2006/main" xmlns:r="http://schemas.openxmlformats.org/officeDocument/2006/relationships" xmlns:p="http://schemas.openxmlformats.org/presentationml/2006/main">
+  <p:cSld>
+    <p:bg>
+      <p:bgPr>
+        <a:solidFill>
+          <a:schemeClr val="bg1"/>
+        </a:solidFill>
+        <a:effectLst/>
+      </p:bgPr>
+    </p:bg>
+    <p:spTree>
+      <p:nvGrpSpPr>
+        <p:cNvPr id="1" name=""/>
+        <p:cNvGrpSpPr/>
+        <p:nvPr/>
+      </p:nvGrpSpPr>
+      <p:grpSpPr>
+        <a:xfrm>
+          <a:off x="0" y="0"/>
+          <a:ext cx="0" cy="0"/>
+          <a:chOff x="0" y="0"/>
+          <a:chExt cx="0" cy="0"/>
+        </a:xfrm>
+      </p:grpSpPr>
+      <p:grpSp>
+        <p:nvGrpSpPr>
+          <p:cNvPr id="10" name="Group 9">
+            <a:extLst>
+              <a:ext uri="{FF2B5EF4-FFF2-40B4-BE49-F238E27FC236}">
+                <a16:creationId xmlns:a16="http://schemas.microsoft.com/office/drawing/2014/main" id="{D4D7444E-8572-6DFD-CB75-0984238C716D}"/>
+              </a:ext>
+              <a:ext uri="{C183D7F6-B498-43B3-948B-1728B52AA6E4}">
+                <adec:decorative xmlns:adec="http://schemas.microsoft.com/office/drawing/2017/decorative" val="1"/>
+              </a:ext>
+            </a:extLst>
+          </p:cNvPr>
+          <p:cNvGrpSpPr>
+            <a:grpSpLocks noGrp="1" noUngrp="1" noRot="1" noChangeAspect="1" noMove="1" noResize="1"/>
+          </p:cNvGrpSpPr>
+          <p:nvPr>
+            <p:extLst>
+              <p:ext uri="{386F3935-93C4-4BCD-93E2-E3B085C9AB24}">
+                <p16:designElem xmlns:p16="http://schemas.microsoft.com/office/powerpoint/2015/main" val="1"/>
+              </p:ext>
+            </p:extLst>
+          </p:nvPr>
+        </p:nvGrpSpPr>
+        <p:grpSpPr>
+          <a:xfrm>
+            <a:off x="-3768" y="6737718"/>
+            <a:ext cx="9155399" cy="123363"/>
+            <a:chOff x="-5025" y="6737718"/>
+            <a:chExt cx="12207200" cy="123363"/>
+          </a:xfrm>
+        </p:grpSpPr>
+        <p:sp>
+          <p:nvSpPr>
+            <p:cNvPr id="11" name="Rectangle 10">
+              <a:extLst>
+                <a:ext uri="{FF2B5EF4-FFF2-40B4-BE49-F238E27FC236}">
+                  <a16:creationId xmlns:a16="http://schemas.microsoft.com/office/drawing/2014/main" id="{01C89D56-574B-DBE6-E414-A886D4CD9B73}"/>
+                </a:ext>
+                <a:ext uri="{C183D7F6-B498-43B3-948B-1728B52AA6E4}">
+                  <adec:decorative xmlns:adec="http://schemas.microsoft.com/office/drawing/2017/decorative" val="1"/>
+                </a:ext>
+              </a:extLst>
+            </p:cNvPr>
+            <p:cNvSpPr/>
+            <p:nvPr>
+              <p:extLst>
+                <p:ext uri="{386F3935-93C4-4BCD-93E2-E3B085C9AB24}">
+                  <p16:designElem xmlns:p16="http://schemas.microsoft.com/office/powerpoint/2015/main" val="1"/>
+                </p:ext>
+              </p:extLst>
+            </p:nvPr>
+          </p:nvSpPr>
+          <p:spPr>
+            <a:xfrm rot="5400000" flipH="1">
+              <a:off x="6036894" y="695800"/>
+              <a:ext cx="123362" cy="12207199"/>
+            </a:xfrm>
+            <a:prstGeom prst="rect">
+              <a:avLst/>
+            </a:prstGeom>
+            <a:gradFill>
+              <a:gsLst>
+                <a:gs pos="0">
+                  <a:schemeClr val="accent5"/>
+                </a:gs>
+                <a:gs pos="100000">
+                  <a:schemeClr val="accent2"/>
+                </a:gs>
+              </a:gsLst>
+              <a:lin ang="1800000" scaled="0"/>
+            </a:gradFill>
+            <a:ln>
+              <a:noFill/>
+            </a:ln>
+          </p:spPr>
+          <p:style>
+            <a:lnRef idx="2">
+              <a:schemeClr val="accent1">
+                <a:shade val="50000"/>
+              </a:schemeClr>
+            </a:lnRef>
+            <a:fillRef idx="1">
+              <a:schemeClr val="accent1"/>
+            </a:fillRef>
+            <a:effectRef idx="0">
+              <a:schemeClr val="accent1"/>
+            </a:effectRef>
+            <a:fontRef idx="minor">
+              <a:schemeClr val="lt1"/>
+            </a:fontRef>
+          </p:style>
+          <p:txBody>
+            <a:bodyPr rtlCol="0" anchor="ctr"/>
+            <a:lstStyle/>
+            <a:p>
+              <a:pPr algn="ctr"/>
+              <a:endParaRPr lang="en-US"/>
+            </a:p>
+          </p:txBody>
+        </p:sp>
+        <p:sp>
+          <p:nvSpPr>
+            <p:cNvPr id="12" name="Rectangle 11">
+              <a:extLst>
+                <a:ext uri="{FF2B5EF4-FFF2-40B4-BE49-F238E27FC236}">
+                  <a16:creationId xmlns:a16="http://schemas.microsoft.com/office/drawing/2014/main" id="{26808B29-2E24-7E95-6543-9B0B821797A8}"/>
+                </a:ext>
+                <a:ext uri="{C183D7F6-B498-43B3-948B-1728B52AA6E4}">
+                  <adec:decorative xmlns:adec="http://schemas.microsoft.com/office/drawing/2017/decorative" val="1"/>
+                </a:ext>
+              </a:extLst>
+            </p:cNvPr>
+            <p:cNvSpPr/>
+            <p:nvPr>
+              <p:extLst>
+                <p:ext uri="{386F3935-93C4-4BCD-93E2-E3B085C9AB24}">
+                  <p16:designElem xmlns:p16="http://schemas.microsoft.com/office/powerpoint/2015/main" val="1"/>
+                </p:ext>
+              </p:extLst>
+            </p:nvPr>
+          </p:nvSpPr>
+          <p:spPr>
+            <a:xfrm rot="16200000">
+              <a:off x="9176406" y="3835311"/>
+              <a:ext cx="123362" cy="5928176"/>
+            </a:xfrm>
+            <a:prstGeom prst="rect">
+              <a:avLst/>
+            </a:prstGeom>
+            <a:gradFill>
+              <a:gsLst>
+                <a:gs pos="19000">
+                  <a:schemeClr val="accent5">
+                    <a:alpha val="0"/>
+                  </a:schemeClr>
+                </a:gs>
+                <a:gs pos="100000">
+                  <a:schemeClr val="accent5">
+                    <a:lumMod val="60000"/>
+                    <a:lumOff val="40000"/>
+                  </a:schemeClr>
+                </a:gs>
+              </a:gsLst>
+              <a:lin ang="600000" scaled="0"/>
+            </a:gradFill>
+            <a:ln>
+              <a:noFill/>
+            </a:ln>
+          </p:spPr>
+          <p:style>
+            <a:lnRef idx="2">
+              <a:schemeClr val="accent1">
+                <a:shade val="50000"/>
+              </a:schemeClr>
+            </a:lnRef>
+            <a:fillRef idx="1">
+              <a:schemeClr val="accent1"/>
+            </a:fillRef>
+            <a:effectRef idx="0">
+              <a:schemeClr val="accent1"/>
+            </a:effectRef>
+            <a:fontRef idx="minor">
+              <a:schemeClr val="lt1"/>
+            </a:fontRef>
+          </p:style>
+          <p:txBody>
+            <a:bodyPr rtlCol="0" anchor="ctr"/>
+            <a:lstStyle/>
+            <a:p>
+              <a:pPr algn="ctr"/>
+              <a:endParaRPr lang="en-US"/>
+            </a:p>
+          </p:txBody>
+        </p:sp>
+      </p:grpSp>
+      <p:pic>
+        <p:nvPicPr>
+          <p:cNvPr id="9" name="Content Placeholder 8" descr="A screenshot of a computer">
+            <a:extLst>
+              <a:ext uri="{FF2B5EF4-FFF2-40B4-BE49-F238E27FC236}">
+                <a16:creationId xmlns:a16="http://schemas.microsoft.com/office/drawing/2014/main" id="{F9DD88A3-9C12-DC28-D7F5-24167E0D2EF2}"/>
+              </a:ext>
+            </a:extLst>
+          </p:cNvPr>
+          <p:cNvPicPr>
+            <a:picLocks noGrp="1" noChangeAspect="1"/>
+          </p:cNvPicPr>
+          <p:nvPr>
+            <p:ph idx="1"/>
+          </p:nvPr>
+        </p:nvPicPr>
+        <p:blipFill>
+          <a:blip r:embed="rId2"/>
+          <a:stretch>
+            <a:fillRect/>
+          </a:stretch>
+        </p:blipFill>
+        <p:spPr>
+          <a:xfrm>
+            <a:off x="0" y="0"/>
+            <a:ext cx="9144000" cy="6858000"/>
+          </a:xfrm>
+        </p:spPr>
+      </p:pic>
+    </p:spTree>
+    <p:extLst>
+      <p:ext uri="{BB962C8B-B14F-4D97-AF65-F5344CB8AC3E}">
+        <p14:creationId xmlns:p14="http://schemas.microsoft.com/office/powerpoint/2010/main" val="875153525"/>
+      </p:ext>
+    </p:extLst>
+  </p:cSld>
+  <p:clrMapOvr>
+    <a:masterClrMapping/>
+  </p:clrMapOvr>
+</p:sld>
+</file>
+
+<file path=ppt/slides/slide35.xml><?xml version="1.0" encoding="utf-8"?>
 <p:sld xmlns:a="http://schemas.openxmlformats.org/drawingml/2006/main" xmlns:r="http://schemas.openxmlformats.org/officeDocument/2006/relationships" xmlns:p="http://schemas.openxmlformats.org/presentationml/2006/main">
   <p:cSld>
     <p:bg>
@@ -20268,7 +20877,7 @@
 </p:sld>
 </file>
 
-<file path=ppt/slides/slide33.xml><?xml version="1.0" encoding="utf-8"?>
+<file path=ppt/slides/slide36.xml><?xml version="1.0" encoding="utf-8"?>
 <p:sld xmlns:a="http://schemas.openxmlformats.org/drawingml/2006/main" xmlns:r="http://schemas.openxmlformats.org/officeDocument/2006/relationships" xmlns:p="http://schemas.openxmlformats.org/presentationml/2006/main">
   <p:cSld>
     <p:spTree>
@@ -20360,7 +20969,7 @@
 </p:sld>
 </file>
 
-<file path=ppt/slides/slide34.xml><?xml version="1.0" encoding="utf-8"?>
+<file path=ppt/slides/slide37.xml><?xml version="1.0" encoding="utf-8"?>
 <p:sld xmlns:a="http://schemas.openxmlformats.org/drawingml/2006/main" xmlns:r="http://schemas.openxmlformats.org/officeDocument/2006/relationships" xmlns:p="http://schemas.openxmlformats.org/presentationml/2006/main">
   <p:cSld>
     <p:spTree>
@@ -20440,7 +21049,7 @@
 </p:sld>
 </file>
 
-<file path=ppt/slides/slide35.xml><?xml version="1.0" encoding="utf-8"?>
+<file path=ppt/slides/slide38.xml><?xml version="1.0" encoding="utf-8"?>
 <p:sld xmlns:a="http://schemas.openxmlformats.org/drawingml/2006/main" xmlns:r="http://schemas.openxmlformats.org/officeDocument/2006/relationships" xmlns:p="http://schemas.openxmlformats.org/presentationml/2006/main">
   <p:cSld>
     <p:spTree>
@@ -20536,7 +21145,7 @@
 </p:sld>
 </file>
 
-<file path=ppt/slides/slide36.xml><?xml version="1.0" encoding="utf-8"?>
+<file path=ppt/slides/slide39.xml><?xml version="1.0" encoding="utf-8"?>
 <p:sld xmlns:a="http://schemas.openxmlformats.org/drawingml/2006/main" xmlns:r="http://schemas.openxmlformats.org/officeDocument/2006/relationships" xmlns:p="http://schemas.openxmlformats.org/presentationml/2006/main">
   <p:cSld>
     <p:spTree>
@@ -20624,661 +21233,6 @@
         </p:txBody>
       </p:sp>
     </p:spTree>
-  </p:cSld>
-  <p:clrMapOvr>
-    <a:masterClrMapping/>
-  </p:clrMapOvr>
-</p:sld>
-</file>
-
-<file path=ppt/slides/slide37.xml><?xml version="1.0" encoding="utf-8"?>
-<p:sld xmlns:a="http://schemas.openxmlformats.org/drawingml/2006/main" xmlns:r="http://schemas.openxmlformats.org/officeDocument/2006/relationships" xmlns:p="http://schemas.openxmlformats.org/presentationml/2006/main">
-  <p:cSld>
-    <p:bg>
-      <p:bgPr>
-        <a:solidFill>
-          <a:schemeClr val="bg1"/>
-        </a:solidFill>
-        <a:effectLst/>
-      </p:bgPr>
-    </p:bg>
-    <p:spTree>
-      <p:nvGrpSpPr>
-        <p:cNvPr id="1" name=""/>
-        <p:cNvGrpSpPr/>
-        <p:nvPr/>
-      </p:nvGrpSpPr>
-      <p:grpSpPr>
-        <a:xfrm>
-          <a:off x="0" y="0"/>
-          <a:ext cx="0" cy="0"/>
-          <a:chOff x="0" y="0"/>
-          <a:chExt cx="0" cy="0"/>
-        </a:xfrm>
-      </p:grpSpPr>
-      <p:sp useBgFill="1">
-        <p:nvSpPr>
-          <p:cNvPr id="20" name="Rectangle 19">
-            <a:extLst>
-              <a:ext uri="{FF2B5EF4-FFF2-40B4-BE49-F238E27FC236}">
-                <a16:creationId xmlns:a16="http://schemas.microsoft.com/office/drawing/2014/main" id="{53B021B3-DE93-4AB7-8A18-CF5F1CED88B8}"/>
-              </a:ext>
-              <a:ext uri="{C183D7F6-B498-43B3-948B-1728B52AA6E4}">
-                <adec:decorative xmlns:adec="http://schemas.microsoft.com/office/drawing/2017/decorative" val="1"/>
-              </a:ext>
-            </a:extLst>
-          </p:cNvPr>
-          <p:cNvSpPr>
-            <a:spLocks noGrp="1" noRot="1" noChangeAspect="1" noMove="1" noResize="1" noEditPoints="1" noAdjustHandles="1" noChangeArrowheads="1" noChangeShapeType="1" noTextEdit="1"/>
-          </p:cNvSpPr>
-          <p:nvPr>
-            <p:extLst>
-              <p:ext uri="{386F3935-93C4-4BCD-93E2-E3B085C9AB24}">
-                <p16:designElem xmlns:p16="http://schemas.microsoft.com/office/powerpoint/2015/main" val="1"/>
-              </p:ext>
-            </p:extLst>
-          </p:nvPr>
-        </p:nvSpPr>
-        <p:spPr>
-          <a:xfrm>
-            <a:off x="0" y="0"/>
-            <a:ext cx="9144000" cy="6858000"/>
-          </a:xfrm>
-          <a:prstGeom prst="rect">
-            <a:avLst/>
-          </a:prstGeom>
-          <a:ln>
-            <a:noFill/>
-          </a:ln>
-        </p:spPr>
-        <p:style>
-          <a:lnRef idx="2">
-            <a:schemeClr val="accent1">
-              <a:shade val="50000"/>
-            </a:schemeClr>
-          </a:lnRef>
-          <a:fillRef idx="1">
-            <a:schemeClr val="accent1"/>
-          </a:fillRef>
-          <a:effectRef idx="0">
-            <a:schemeClr val="accent1"/>
-          </a:effectRef>
-          <a:fontRef idx="minor">
-            <a:schemeClr val="lt1"/>
-          </a:fontRef>
-        </p:style>
-        <p:txBody>
-          <a:bodyPr rtlCol="0" anchor="ctr"/>
-          <a:lstStyle/>
-          <a:p>
-            <a:pPr algn="ctr"/>
-            <a:endParaRPr lang="en-US"/>
-          </a:p>
-        </p:txBody>
-      </p:sp>
-      <p:sp>
-        <p:nvSpPr>
-          <p:cNvPr id="2" name="Title 1">
-            <a:extLst>
-              <a:ext uri="{FF2B5EF4-FFF2-40B4-BE49-F238E27FC236}">
-                <a16:creationId xmlns:a16="http://schemas.microsoft.com/office/drawing/2014/main" id="{E6A618A9-36CA-F901-1C21-543F9C2B7DE3}"/>
-              </a:ext>
-            </a:extLst>
-          </p:cNvPr>
-          <p:cNvSpPr>
-            <a:spLocks noGrp="1"/>
-          </p:cNvSpPr>
-          <p:nvPr>
-            <p:ph type="title"/>
-          </p:nvPr>
-        </p:nvSpPr>
-        <p:spPr>
-          <a:xfrm>
-            <a:off x="630936" y="256032"/>
-            <a:ext cx="7879842" cy="1014984"/>
-          </a:xfrm>
-        </p:spPr>
-        <p:txBody>
-          <a:bodyPr anchor="b">
-            <a:normAutofit/>
-          </a:bodyPr>
-          <a:lstStyle/>
-          <a:p>
-            <a:r>
-              <a:rPr lang="en-US"/>
-              <a:t>Release Plan</a:t>
-            </a:r>
-            <a:endParaRPr lang="en-US" dirty="0"/>
-          </a:p>
-        </p:txBody>
-      </p:sp>
-      <p:sp>
-        <p:nvSpPr>
-          <p:cNvPr id="22" name="Rectangle 21">
-            <a:extLst>
-              <a:ext uri="{FF2B5EF4-FFF2-40B4-BE49-F238E27FC236}">
-                <a16:creationId xmlns:a16="http://schemas.microsoft.com/office/drawing/2014/main" id="{52D502E5-F6B4-4D58-B4AE-FC466FF15EE8}"/>
-              </a:ext>
-              <a:ext uri="{C183D7F6-B498-43B3-948B-1728B52AA6E4}">
-                <adec:decorative xmlns:adec="http://schemas.microsoft.com/office/drawing/2017/decorative" val="1"/>
-              </a:ext>
-            </a:extLst>
-          </p:cNvPr>
-          <p:cNvSpPr>
-            <a:spLocks noGrp="1" noRot="1" noChangeAspect="1" noMove="1" noResize="1" noEditPoints="1" noAdjustHandles="1" noChangeArrowheads="1" noChangeShapeType="1" noTextEdit="1"/>
-          </p:cNvSpPr>
-          <p:nvPr>
-            <p:extLst>
-              <p:ext uri="{386F3935-93C4-4BCD-93E2-E3B085C9AB24}">
-                <p16:designElem xmlns:p16="http://schemas.microsoft.com/office/powerpoint/2015/main" val="1"/>
-              </p:ext>
-            </p:extLst>
-          </p:nvPr>
-        </p:nvSpPr>
-        <p:spPr>
-          <a:xfrm>
-            <a:off x="649464" y="1634502"/>
-            <a:ext cx="7838694" cy="18288"/>
-          </a:xfrm>
-          <a:prstGeom prst="rect">
-            <a:avLst/>
-          </a:prstGeom>
-          <a:solidFill>
-            <a:srgbClr val="D5D5D5"/>
-          </a:solidFill>
-          <a:ln w="3175">
-            <a:noFill/>
-          </a:ln>
-          <a:effectLst/>
-        </p:spPr>
-        <p:style>
-          <a:lnRef idx="2">
-            <a:schemeClr val="accent1">
-              <a:shade val="50000"/>
-            </a:schemeClr>
-          </a:lnRef>
-          <a:fillRef idx="1">
-            <a:schemeClr val="accent1"/>
-          </a:fillRef>
-          <a:effectRef idx="0">
-            <a:schemeClr val="accent1"/>
-          </a:effectRef>
-          <a:fontRef idx="minor">
-            <a:schemeClr val="lt1"/>
-          </a:fontRef>
-        </p:style>
-        <p:txBody>
-          <a:bodyPr rtlCol="0" anchor="ctr"/>
-          <a:lstStyle/>
-          <a:p>
-            <a:pPr algn="ctr"/>
-            <a:endParaRPr lang="en-US">
-              <a:solidFill>
-                <a:prstClr val="white"/>
-              </a:solidFill>
-              <a:latin typeface="Calibri" panose="020F0502020204030204"/>
-            </a:endParaRPr>
-          </a:p>
-        </p:txBody>
-      </p:sp>
-      <p:sp>
-        <p:nvSpPr>
-          <p:cNvPr id="24" name="Rectangle 23">
-            <a:extLst>
-              <a:ext uri="{FF2B5EF4-FFF2-40B4-BE49-F238E27FC236}">
-                <a16:creationId xmlns:a16="http://schemas.microsoft.com/office/drawing/2014/main" id="{9DECDBF4-02B6-4BB4-B65B-B8107AD6A9E8}"/>
-              </a:ext>
-              <a:ext uri="{C183D7F6-B498-43B3-948B-1728B52AA6E4}">
-                <adec:decorative xmlns:adec="http://schemas.microsoft.com/office/drawing/2017/decorative" val="1"/>
-              </a:ext>
-            </a:extLst>
-          </p:cNvPr>
-          <p:cNvSpPr>
-            <a:spLocks noGrp="1" noRot="1" noChangeAspect="1" noMove="1" noResize="1" noEditPoints="1" noAdjustHandles="1" noChangeArrowheads="1" noChangeShapeType="1" noTextEdit="1"/>
-          </p:cNvSpPr>
-          <p:nvPr>
-            <p:extLst>
-              <p:ext uri="{386F3935-93C4-4BCD-93E2-E3B085C9AB24}">
-                <p16:designElem xmlns:p16="http://schemas.microsoft.com/office/powerpoint/2015/main" val="1"/>
-              </p:ext>
-            </p:extLst>
-          </p:nvPr>
-        </p:nvSpPr>
-        <p:spPr>
-          <a:xfrm flipV="1">
-            <a:off x="630936" y="1538176"/>
-            <a:ext cx="1405092" cy="109814"/>
-          </a:xfrm>
-          <a:prstGeom prst="rect">
-            <a:avLst/>
-          </a:prstGeom>
-          <a:solidFill>
-            <a:schemeClr val="accent2"/>
-          </a:solidFill>
-          <a:ln>
-            <a:noFill/>
-          </a:ln>
-        </p:spPr>
-        <p:style>
-          <a:lnRef idx="2">
-            <a:schemeClr val="accent1">
-              <a:shade val="50000"/>
-            </a:schemeClr>
-          </a:lnRef>
-          <a:fillRef idx="1">
-            <a:schemeClr val="accent1"/>
-          </a:fillRef>
-          <a:effectRef idx="0">
-            <a:schemeClr val="accent1"/>
-          </a:effectRef>
-          <a:fontRef idx="minor">
-            <a:schemeClr val="lt1"/>
-          </a:fontRef>
-        </p:style>
-        <p:txBody>
-          <a:bodyPr rtlCol="0" anchor="ctr"/>
-          <a:lstStyle/>
-          <a:p>
-            <a:pPr algn="ctr"/>
-            <a:endParaRPr lang="en-US">
-              <a:solidFill>
-                <a:prstClr val="white"/>
-              </a:solidFill>
-              <a:latin typeface="Calibri" panose="020F0502020204030204"/>
-            </a:endParaRPr>
-          </a:p>
-        </p:txBody>
-      </p:sp>
-      <p:graphicFrame>
-        <p:nvGraphicFramePr>
-          <p:cNvPr id="15" name="Content Placeholder 14">
-            <a:extLst>
-              <a:ext uri="{FF2B5EF4-FFF2-40B4-BE49-F238E27FC236}">
-                <a16:creationId xmlns:a16="http://schemas.microsoft.com/office/drawing/2014/main" id="{52B756F0-5797-0A17-BA30-B7456DBD4F34}"/>
-              </a:ext>
-            </a:extLst>
-          </p:cNvPr>
-          <p:cNvGraphicFramePr>
-            <a:graphicFrameLocks noGrp="1"/>
-          </p:cNvGraphicFramePr>
-          <p:nvPr>
-            <p:ph idx="1"/>
-            <p:extLst>
-              <p:ext uri="{D42A27DB-BD31-4B8C-83A1-F6EECF244321}">
-                <p14:modId xmlns:p14="http://schemas.microsoft.com/office/powerpoint/2010/main" val="2779066527"/>
-              </p:ext>
-            </p:extLst>
-          </p:nvPr>
-        </p:nvGraphicFramePr>
-        <p:xfrm>
-          <a:off x="632784" y="1926266"/>
-          <a:ext cx="7878432" cy="4683773"/>
-        </p:xfrm>
-        <a:graphic>
-          <a:graphicData uri="http://schemas.openxmlformats.org/drawingml/2006/table">
-            <a:tbl>
-              <a:tblPr/>
-              <a:tblGrid>
-                <a:gridCol w="2880096">
-                  <a:extLst>
-                    <a:ext uri="{9D8B030D-6E8A-4147-A177-3AD203B41FA5}">
-                      <a16:colId xmlns:a16="http://schemas.microsoft.com/office/drawing/2014/main" val="1901526426"/>
-                    </a:ext>
-                  </a:extLst>
-                </a:gridCol>
-                <a:gridCol w="4998336">
-                  <a:extLst>
-                    <a:ext uri="{9D8B030D-6E8A-4147-A177-3AD203B41FA5}">
-                      <a16:colId xmlns:a16="http://schemas.microsoft.com/office/drawing/2014/main" val="2676363107"/>
-                    </a:ext>
-                  </a:extLst>
-                </a:gridCol>
-              </a:tblGrid>
-              <a:tr h="563915">
-                <a:tc>
-                  <a:txBody>
-                    <a:bodyPr/>
-                    <a:lstStyle/>
-                    <a:p>
-                      <a:pPr>
-                        <a:buNone/>
-                      </a:pPr>
-                      <a:r>
-                        <a:rPr lang="en-US" sz="2500"/>
-                        <a:t>Release</a:t>
-                      </a:r>
-                    </a:p>
-                  </a:txBody>
-                  <a:tcPr marL="128162" marR="128162" marT="64081" marB="64081" anchor="ctr">
-                    <a:lnL>
-                      <a:noFill/>
-                    </a:lnL>
-                    <a:lnR>
-                      <a:noFill/>
-                    </a:lnR>
-                    <a:lnT>
-                      <a:noFill/>
-                    </a:lnT>
-                    <a:lnB>
-                      <a:noFill/>
-                    </a:lnB>
-                    <a:noFill/>
-                  </a:tcPr>
-                </a:tc>
-                <a:tc>
-                  <a:txBody>
-                    <a:bodyPr/>
-                    <a:lstStyle/>
-                    <a:p>
-                      <a:pPr>
-                        <a:buNone/>
-                      </a:pPr>
-                      <a:r>
-                        <a:rPr lang="en-US" sz="2500"/>
-                        <a:t>Features / Deliverables</a:t>
-                      </a:r>
-                    </a:p>
-                  </a:txBody>
-                  <a:tcPr marL="128162" marR="128162" marT="64081" marB="64081" anchor="ctr">
-                    <a:lnL>
-                      <a:noFill/>
-                    </a:lnL>
-                    <a:lnR>
-                      <a:noFill/>
-                    </a:lnR>
-                    <a:lnT>
-                      <a:noFill/>
-                    </a:lnT>
-                    <a:lnB>
-                      <a:noFill/>
-                    </a:lnB>
-                    <a:noFill/>
-                  </a:tcPr>
-                </a:tc>
-                <a:extLst>
-                  <a:ext uri="{0D108BD9-81ED-4DB2-BD59-A6C34878D82A}">
-                    <a16:rowId xmlns:a16="http://schemas.microsoft.com/office/drawing/2014/main" val="1099136382"/>
-                  </a:ext>
-                </a:extLst>
-              </a:tr>
-              <a:tr h="948403">
-                <a:tc>
-                  <a:txBody>
-                    <a:bodyPr/>
-                    <a:lstStyle/>
-                    <a:p>
-                      <a:pPr>
-                        <a:buNone/>
-                      </a:pPr>
-                      <a:r>
-                        <a:rPr lang="en-US" sz="2500" dirty="0"/>
-                        <a:t>Release 1 </a:t>
-                      </a:r>
-                    </a:p>
-                  </a:txBody>
-                  <a:tcPr marL="128162" marR="128162" marT="64081" marB="64081" anchor="ctr">
-                    <a:lnL>
-                      <a:noFill/>
-                    </a:lnL>
-                    <a:lnR>
-                      <a:noFill/>
-                    </a:lnR>
-                    <a:lnT>
-                      <a:noFill/>
-                    </a:lnT>
-                    <a:lnB>
-                      <a:noFill/>
-                    </a:lnB>
-                    <a:noFill/>
-                  </a:tcPr>
-                </a:tc>
-                <a:tc>
-                  <a:txBody>
-                    <a:bodyPr/>
-                    <a:lstStyle/>
-                    <a:p>
-                      <a:pPr>
-                        <a:buNone/>
-                      </a:pPr>
-                      <a:r>
-                        <a:rPr lang="en-US" sz="2500" dirty="0"/>
-                        <a:t>User Registration, Login, Browse Products</a:t>
-                      </a:r>
-                    </a:p>
-                  </a:txBody>
-                  <a:tcPr marL="128162" marR="128162" marT="64081" marB="64081" anchor="ctr">
-                    <a:lnL>
-                      <a:noFill/>
-                    </a:lnL>
-                    <a:lnR>
-                      <a:noFill/>
-                    </a:lnR>
-                    <a:lnT>
-                      <a:noFill/>
-                    </a:lnT>
-                    <a:lnB>
-                      <a:noFill/>
-                    </a:lnB>
-                    <a:noFill/>
-                  </a:tcPr>
-                </a:tc>
-                <a:extLst>
-                  <a:ext uri="{0D108BD9-81ED-4DB2-BD59-A6C34878D82A}">
-                    <a16:rowId xmlns:a16="http://schemas.microsoft.com/office/drawing/2014/main" val="1578996664"/>
-                  </a:ext>
-                </a:extLst>
-              </a:tr>
-              <a:tr h="563915">
-                <a:tc>
-                  <a:txBody>
-                    <a:bodyPr/>
-                    <a:lstStyle/>
-                    <a:p>
-                      <a:pPr>
-                        <a:buNone/>
-                      </a:pPr>
-                      <a:r>
-                        <a:rPr lang="en-US" sz="2500"/>
-                        <a:t>Release 2</a:t>
-                      </a:r>
-                    </a:p>
-                  </a:txBody>
-                  <a:tcPr marL="128162" marR="128162" marT="64081" marB="64081" anchor="ctr">
-                    <a:lnL>
-                      <a:noFill/>
-                    </a:lnL>
-                    <a:lnR>
-                      <a:noFill/>
-                    </a:lnR>
-                    <a:lnT>
-                      <a:noFill/>
-                    </a:lnT>
-                    <a:lnB>
-                      <a:noFill/>
-                    </a:lnB>
-                    <a:noFill/>
-                  </a:tcPr>
-                </a:tc>
-                <a:tc>
-                  <a:txBody>
-                    <a:bodyPr/>
-                    <a:lstStyle/>
-                    <a:p>
-                      <a:pPr>
-                        <a:buNone/>
-                      </a:pPr>
-                      <a:r>
-                        <a:rPr lang="en-US" sz="2500" dirty="0"/>
-                        <a:t>Checkout, Search Products, Add to Cart</a:t>
-                      </a:r>
-                    </a:p>
-                  </a:txBody>
-                  <a:tcPr marL="128162" marR="128162" marT="64081" marB="64081" anchor="ctr">
-                    <a:lnL>
-                      <a:noFill/>
-                    </a:lnL>
-                    <a:lnR>
-                      <a:noFill/>
-                    </a:lnR>
-                    <a:lnT>
-                      <a:noFill/>
-                    </a:lnT>
-                    <a:lnB>
-                      <a:noFill/>
-                    </a:lnB>
-                    <a:noFill/>
-                  </a:tcPr>
-                </a:tc>
-                <a:extLst>
-                  <a:ext uri="{0D108BD9-81ED-4DB2-BD59-A6C34878D82A}">
-                    <a16:rowId xmlns:a16="http://schemas.microsoft.com/office/drawing/2014/main" val="1267600689"/>
-                  </a:ext>
-                </a:extLst>
-              </a:tr>
-              <a:tr h="948403">
-                <a:tc>
-                  <a:txBody>
-                    <a:bodyPr/>
-                    <a:lstStyle/>
-                    <a:p>
-                      <a:pPr>
-                        <a:buNone/>
-                      </a:pPr>
-                      <a:r>
-                        <a:rPr lang="en-US" sz="2500"/>
-                        <a:t>Release 3</a:t>
-                      </a:r>
-                    </a:p>
-                  </a:txBody>
-                  <a:tcPr marL="128162" marR="128162" marT="64081" marB="64081" anchor="ctr">
-                    <a:lnL>
-                      <a:noFill/>
-                    </a:lnL>
-                    <a:lnR>
-                      <a:noFill/>
-                    </a:lnR>
-                    <a:lnT>
-                      <a:noFill/>
-                    </a:lnT>
-                    <a:lnB>
-                      <a:noFill/>
-                    </a:lnB>
-                    <a:noFill/>
-                  </a:tcPr>
-                </a:tc>
-                <a:tc>
-                  <a:txBody>
-                    <a:bodyPr/>
-                    <a:lstStyle/>
-                    <a:p>
-                      <a:pPr>
-                        <a:buNone/>
-                      </a:pPr>
-                      <a:r>
-                        <a:rPr lang="en-US" sz="2500"/>
-                        <a:t>Track Orders, Wishlist, Review Products</a:t>
-                      </a:r>
-                    </a:p>
-                  </a:txBody>
-                  <a:tcPr marL="128162" marR="128162" marT="64081" marB="64081" anchor="ctr">
-                    <a:lnL>
-                      <a:noFill/>
-                    </a:lnL>
-                    <a:lnR>
-                      <a:noFill/>
-                    </a:lnR>
-                    <a:lnT>
-                      <a:noFill/>
-                    </a:lnT>
-                    <a:lnB>
-                      <a:noFill/>
-                    </a:lnB>
-                    <a:noFill/>
-                  </a:tcPr>
-                </a:tc>
-                <a:extLst>
-                  <a:ext uri="{0D108BD9-81ED-4DB2-BD59-A6C34878D82A}">
-                    <a16:rowId xmlns:a16="http://schemas.microsoft.com/office/drawing/2014/main" val="2078314053"/>
-                  </a:ext>
-                </a:extLst>
-              </a:tr>
-              <a:tr h="1332890">
-                <a:tc>
-                  <a:txBody>
-                    <a:bodyPr/>
-                    <a:lstStyle/>
-                    <a:p>
-                      <a:pPr>
-                        <a:buNone/>
-                      </a:pPr>
-                      <a:r>
-                        <a:rPr lang="en-US" sz="2500"/>
-                        <a:t>Release 4</a:t>
-                      </a:r>
-                    </a:p>
-                  </a:txBody>
-                  <a:tcPr marL="128162" marR="128162" marT="64081" marB="64081" anchor="ctr">
-                    <a:lnL>
-                      <a:noFill/>
-                    </a:lnL>
-                    <a:lnR>
-                      <a:noFill/>
-                    </a:lnR>
-                    <a:lnT>
-                      <a:noFill/>
-                    </a:lnT>
-                    <a:lnB>
-                      <a:noFill/>
-                    </a:lnB>
-                    <a:noFill/>
-                  </a:tcPr>
-                </a:tc>
-                <a:tc>
-                  <a:txBody>
-                    <a:bodyPr/>
-                    <a:lstStyle/>
-                    <a:p>
-                      <a:pPr>
-                        <a:buNone/>
-                      </a:pPr>
-                      <a:r>
-                        <a:rPr lang="en-US" sz="2500" dirty="0"/>
-                        <a:t>Admin Management (Add/Edit/Delete Products, View Reports)</a:t>
-                      </a:r>
-                    </a:p>
-                  </a:txBody>
-                  <a:tcPr marL="128162" marR="128162" marT="64081" marB="64081" anchor="ctr">
-                    <a:lnL>
-                      <a:noFill/>
-                    </a:lnL>
-                    <a:lnR>
-                      <a:noFill/>
-                    </a:lnR>
-                    <a:lnT>
-                      <a:noFill/>
-                    </a:lnT>
-                    <a:lnB>
-                      <a:noFill/>
-                    </a:lnB>
-                    <a:noFill/>
-                  </a:tcPr>
-                </a:tc>
-                <a:extLst>
-                  <a:ext uri="{0D108BD9-81ED-4DB2-BD59-A6C34878D82A}">
-                    <a16:rowId xmlns:a16="http://schemas.microsoft.com/office/drawing/2014/main" val="2877564795"/>
-                  </a:ext>
-                </a:extLst>
-              </a:tr>
-            </a:tbl>
-          </a:graphicData>
-        </a:graphic>
-      </p:graphicFrame>
-    </p:spTree>
-    <p:extLst>
-      <p:ext uri="{BB962C8B-B14F-4D97-AF65-F5344CB8AC3E}">
-        <p14:creationId xmlns:p14="http://schemas.microsoft.com/office/powerpoint/2010/main" val="894627120"/>
-      </p:ext>
-    </p:extLst>
   </p:cSld>
   <p:clrMapOvr>
     <a:masterClrMapping/>
@@ -22229,6 +22183,661 @@
     <p:extLst>
       <p:ext uri="{BB962C8B-B14F-4D97-AF65-F5344CB8AC3E}">
         <p14:creationId xmlns:p14="http://schemas.microsoft.com/office/powerpoint/2010/main" val="2399504942"/>
+      </p:ext>
+    </p:extLst>
+  </p:cSld>
+  <p:clrMapOvr>
+    <a:masterClrMapping/>
+  </p:clrMapOvr>
+</p:sld>
+</file>
+
+<file path=ppt/slides/slide40.xml><?xml version="1.0" encoding="utf-8"?>
+<p:sld xmlns:a="http://schemas.openxmlformats.org/drawingml/2006/main" xmlns:r="http://schemas.openxmlformats.org/officeDocument/2006/relationships" xmlns:p="http://schemas.openxmlformats.org/presentationml/2006/main">
+  <p:cSld>
+    <p:bg>
+      <p:bgPr>
+        <a:solidFill>
+          <a:schemeClr val="bg1"/>
+        </a:solidFill>
+        <a:effectLst/>
+      </p:bgPr>
+    </p:bg>
+    <p:spTree>
+      <p:nvGrpSpPr>
+        <p:cNvPr id="1" name=""/>
+        <p:cNvGrpSpPr/>
+        <p:nvPr/>
+      </p:nvGrpSpPr>
+      <p:grpSpPr>
+        <a:xfrm>
+          <a:off x="0" y="0"/>
+          <a:ext cx="0" cy="0"/>
+          <a:chOff x="0" y="0"/>
+          <a:chExt cx="0" cy="0"/>
+        </a:xfrm>
+      </p:grpSpPr>
+      <p:sp useBgFill="1">
+        <p:nvSpPr>
+          <p:cNvPr id="20" name="Rectangle 19">
+            <a:extLst>
+              <a:ext uri="{FF2B5EF4-FFF2-40B4-BE49-F238E27FC236}">
+                <a16:creationId xmlns:a16="http://schemas.microsoft.com/office/drawing/2014/main" id="{53B021B3-DE93-4AB7-8A18-CF5F1CED88B8}"/>
+              </a:ext>
+              <a:ext uri="{C183D7F6-B498-43B3-948B-1728B52AA6E4}">
+                <adec:decorative xmlns:adec="http://schemas.microsoft.com/office/drawing/2017/decorative" val="1"/>
+              </a:ext>
+            </a:extLst>
+          </p:cNvPr>
+          <p:cNvSpPr>
+            <a:spLocks noGrp="1" noRot="1" noChangeAspect="1" noMove="1" noResize="1" noEditPoints="1" noAdjustHandles="1" noChangeArrowheads="1" noChangeShapeType="1" noTextEdit="1"/>
+          </p:cNvSpPr>
+          <p:nvPr>
+            <p:extLst>
+              <p:ext uri="{386F3935-93C4-4BCD-93E2-E3B085C9AB24}">
+                <p16:designElem xmlns:p16="http://schemas.microsoft.com/office/powerpoint/2015/main" val="1"/>
+              </p:ext>
+            </p:extLst>
+          </p:nvPr>
+        </p:nvSpPr>
+        <p:spPr>
+          <a:xfrm>
+            <a:off x="0" y="0"/>
+            <a:ext cx="9144000" cy="6858000"/>
+          </a:xfrm>
+          <a:prstGeom prst="rect">
+            <a:avLst/>
+          </a:prstGeom>
+          <a:ln>
+            <a:noFill/>
+          </a:ln>
+        </p:spPr>
+        <p:style>
+          <a:lnRef idx="2">
+            <a:schemeClr val="accent1">
+              <a:shade val="50000"/>
+            </a:schemeClr>
+          </a:lnRef>
+          <a:fillRef idx="1">
+            <a:schemeClr val="accent1"/>
+          </a:fillRef>
+          <a:effectRef idx="0">
+            <a:schemeClr val="accent1"/>
+          </a:effectRef>
+          <a:fontRef idx="minor">
+            <a:schemeClr val="lt1"/>
+          </a:fontRef>
+        </p:style>
+        <p:txBody>
+          <a:bodyPr rtlCol="0" anchor="ctr"/>
+          <a:lstStyle/>
+          <a:p>
+            <a:pPr algn="ctr"/>
+            <a:endParaRPr lang="en-US"/>
+          </a:p>
+        </p:txBody>
+      </p:sp>
+      <p:sp>
+        <p:nvSpPr>
+          <p:cNvPr id="2" name="Title 1">
+            <a:extLst>
+              <a:ext uri="{FF2B5EF4-FFF2-40B4-BE49-F238E27FC236}">
+                <a16:creationId xmlns:a16="http://schemas.microsoft.com/office/drawing/2014/main" id="{E6A618A9-36CA-F901-1C21-543F9C2B7DE3}"/>
+              </a:ext>
+            </a:extLst>
+          </p:cNvPr>
+          <p:cNvSpPr>
+            <a:spLocks noGrp="1"/>
+          </p:cNvSpPr>
+          <p:nvPr>
+            <p:ph type="title"/>
+          </p:nvPr>
+        </p:nvSpPr>
+        <p:spPr>
+          <a:xfrm>
+            <a:off x="630936" y="256032"/>
+            <a:ext cx="7879842" cy="1014984"/>
+          </a:xfrm>
+        </p:spPr>
+        <p:txBody>
+          <a:bodyPr anchor="b">
+            <a:normAutofit/>
+          </a:bodyPr>
+          <a:lstStyle/>
+          <a:p>
+            <a:r>
+              <a:rPr lang="en-US"/>
+              <a:t>Release Plan</a:t>
+            </a:r>
+            <a:endParaRPr lang="en-US" dirty="0"/>
+          </a:p>
+        </p:txBody>
+      </p:sp>
+      <p:sp>
+        <p:nvSpPr>
+          <p:cNvPr id="22" name="Rectangle 21">
+            <a:extLst>
+              <a:ext uri="{FF2B5EF4-FFF2-40B4-BE49-F238E27FC236}">
+                <a16:creationId xmlns:a16="http://schemas.microsoft.com/office/drawing/2014/main" id="{52D502E5-F6B4-4D58-B4AE-FC466FF15EE8}"/>
+              </a:ext>
+              <a:ext uri="{C183D7F6-B498-43B3-948B-1728B52AA6E4}">
+                <adec:decorative xmlns:adec="http://schemas.microsoft.com/office/drawing/2017/decorative" val="1"/>
+              </a:ext>
+            </a:extLst>
+          </p:cNvPr>
+          <p:cNvSpPr>
+            <a:spLocks noGrp="1" noRot="1" noChangeAspect="1" noMove="1" noResize="1" noEditPoints="1" noAdjustHandles="1" noChangeArrowheads="1" noChangeShapeType="1" noTextEdit="1"/>
+          </p:cNvSpPr>
+          <p:nvPr>
+            <p:extLst>
+              <p:ext uri="{386F3935-93C4-4BCD-93E2-E3B085C9AB24}">
+                <p16:designElem xmlns:p16="http://schemas.microsoft.com/office/powerpoint/2015/main" val="1"/>
+              </p:ext>
+            </p:extLst>
+          </p:nvPr>
+        </p:nvSpPr>
+        <p:spPr>
+          <a:xfrm>
+            <a:off x="649464" y="1634502"/>
+            <a:ext cx="7838694" cy="18288"/>
+          </a:xfrm>
+          <a:prstGeom prst="rect">
+            <a:avLst/>
+          </a:prstGeom>
+          <a:solidFill>
+            <a:srgbClr val="D5D5D5"/>
+          </a:solidFill>
+          <a:ln w="3175">
+            <a:noFill/>
+          </a:ln>
+          <a:effectLst/>
+        </p:spPr>
+        <p:style>
+          <a:lnRef idx="2">
+            <a:schemeClr val="accent1">
+              <a:shade val="50000"/>
+            </a:schemeClr>
+          </a:lnRef>
+          <a:fillRef idx="1">
+            <a:schemeClr val="accent1"/>
+          </a:fillRef>
+          <a:effectRef idx="0">
+            <a:schemeClr val="accent1"/>
+          </a:effectRef>
+          <a:fontRef idx="minor">
+            <a:schemeClr val="lt1"/>
+          </a:fontRef>
+        </p:style>
+        <p:txBody>
+          <a:bodyPr rtlCol="0" anchor="ctr"/>
+          <a:lstStyle/>
+          <a:p>
+            <a:pPr algn="ctr"/>
+            <a:endParaRPr lang="en-US">
+              <a:solidFill>
+                <a:prstClr val="white"/>
+              </a:solidFill>
+              <a:latin typeface="Calibri" panose="020F0502020204030204"/>
+            </a:endParaRPr>
+          </a:p>
+        </p:txBody>
+      </p:sp>
+      <p:sp>
+        <p:nvSpPr>
+          <p:cNvPr id="24" name="Rectangle 23">
+            <a:extLst>
+              <a:ext uri="{FF2B5EF4-FFF2-40B4-BE49-F238E27FC236}">
+                <a16:creationId xmlns:a16="http://schemas.microsoft.com/office/drawing/2014/main" id="{9DECDBF4-02B6-4BB4-B65B-B8107AD6A9E8}"/>
+              </a:ext>
+              <a:ext uri="{C183D7F6-B498-43B3-948B-1728B52AA6E4}">
+                <adec:decorative xmlns:adec="http://schemas.microsoft.com/office/drawing/2017/decorative" val="1"/>
+              </a:ext>
+            </a:extLst>
+          </p:cNvPr>
+          <p:cNvSpPr>
+            <a:spLocks noGrp="1" noRot="1" noChangeAspect="1" noMove="1" noResize="1" noEditPoints="1" noAdjustHandles="1" noChangeArrowheads="1" noChangeShapeType="1" noTextEdit="1"/>
+          </p:cNvSpPr>
+          <p:nvPr>
+            <p:extLst>
+              <p:ext uri="{386F3935-93C4-4BCD-93E2-E3B085C9AB24}">
+                <p16:designElem xmlns:p16="http://schemas.microsoft.com/office/powerpoint/2015/main" val="1"/>
+              </p:ext>
+            </p:extLst>
+          </p:nvPr>
+        </p:nvSpPr>
+        <p:spPr>
+          <a:xfrm flipV="1">
+            <a:off x="630936" y="1538176"/>
+            <a:ext cx="1405092" cy="109814"/>
+          </a:xfrm>
+          <a:prstGeom prst="rect">
+            <a:avLst/>
+          </a:prstGeom>
+          <a:solidFill>
+            <a:schemeClr val="accent2"/>
+          </a:solidFill>
+          <a:ln>
+            <a:noFill/>
+          </a:ln>
+        </p:spPr>
+        <p:style>
+          <a:lnRef idx="2">
+            <a:schemeClr val="accent1">
+              <a:shade val="50000"/>
+            </a:schemeClr>
+          </a:lnRef>
+          <a:fillRef idx="1">
+            <a:schemeClr val="accent1"/>
+          </a:fillRef>
+          <a:effectRef idx="0">
+            <a:schemeClr val="accent1"/>
+          </a:effectRef>
+          <a:fontRef idx="minor">
+            <a:schemeClr val="lt1"/>
+          </a:fontRef>
+        </p:style>
+        <p:txBody>
+          <a:bodyPr rtlCol="0" anchor="ctr"/>
+          <a:lstStyle/>
+          <a:p>
+            <a:pPr algn="ctr"/>
+            <a:endParaRPr lang="en-US">
+              <a:solidFill>
+                <a:prstClr val="white"/>
+              </a:solidFill>
+              <a:latin typeface="Calibri" panose="020F0502020204030204"/>
+            </a:endParaRPr>
+          </a:p>
+        </p:txBody>
+      </p:sp>
+      <p:graphicFrame>
+        <p:nvGraphicFramePr>
+          <p:cNvPr id="15" name="Content Placeholder 14">
+            <a:extLst>
+              <a:ext uri="{FF2B5EF4-FFF2-40B4-BE49-F238E27FC236}">
+                <a16:creationId xmlns:a16="http://schemas.microsoft.com/office/drawing/2014/main" id="{52B756F0-5797-0A17-BA30-B7456DBD4F34}"/>
+              </a:ext>
+            </a:extLst>
+          </p:cNvPr>
+          <p:cNvGraphicFramePr>
+            <a:graphicFrameLocks noGrp="1"/>
+          </p:cNvGraphicFramePr>
+          <p:nvPr>
+            <p:ph idx="1"/>
+            <p:extLst>
+              <p:ext uri="{D42A27DB-BD31-4B8C-83A1-F6EECF244321}">
+                <p14:modId xmlns:p14="http://schemas.microsoft.com/office/powerpoint/2010/main" val="2779066527"/>
+              </p:ext>
+            </p:extLst>
+          </p:nvPr>
+        </p:nvGraphicFramePr>
+        <p:xfrm>
+          <a:off x="632784" y="1926266"/>
+          <a:ext cx="7878432" cy="4683773"/>
+        </p:xfrm>
+        <a:graphic>
+          <a:graphicData uri="http://schemas.openxmlformats.org/drawingml/2006/table">
+            <a:tbl>
+              <a:tblPr/>
+              <a:tblGrid>
+                <a:gridCol w="2880096">
+                  <a:extLst>
+                    <a:ext uri="{9D8B030D-6E8A-4147-A177-3AD203B41FA5}">
+                      <a16:colId xmlns:a16="http://schemas.microsoft.com/office/drawing/2014/main" val="1901526426"/>
+                    </a:ext>
+                  </a:extLst>
+                </a:gridCol>
+                <a:gridCol w="4998336">
+                  <a:extLst>
+                    <a:ext uri="{9D8B030D-6E8A-4147-A177-3AD203B41FA5}">
+                      <a16:colId xmlns:a16="http://schemas.microsoft.com/office/drawing/2014/main" val="2676363107"/>
+                    </a:ext>
+                  </a:extLst>
+                </a:gridCol>
+              </a:tblGrid>
+              <a:tr h="563915">
+                <a:tc>
+                  <a:txBody>
+                    <a:bodyPr/>
+                    <a:lstStyle/>
+                    <a:p>
+                      <a:pPr>
+                        <a:buNone/>
+                      </a:pPr>
+                      <a:r>
+                        <a:rPr lang="en-US" sz="2500"/>
+                        <a:t>Release</a:t>
+                      </a:r>
+                    </a:p>
+                  </a:txBody>
+                  <a:tcPr marL="128162" marR="128162" marT="64081" marB="64081" anchor="ctr">
+                    <a:lnL>
+                      <a:noFill/>
+                    </a:lnL>
+                    <a:lnR>
+                      <a:noFill/>
+                    </a:lnR>
+                    <a:lnT>
+                      <a:noFill/>
+                    </a:lnT>
+                    <a:lnB>
+                      <a:noFill/>
+                    </a:lnB>
+                    <a:noFill/>
+                  </a:tcPr>
+                </a:tc>
+                <a:tc>
+                  <a:txBody>
+                    <a:bodyPr/>
+                    <a:lstStyle/>
+                    <a:p>
+                      <a:pPr>
+                        <a:buNone/>
+                      </a:pPr>
+                      <a:r>
+                        <a:rPr lang="en-US" sz="2500"/>
+                        <a:t>Features / Deliverables</a:t>
+                      </a:r>
+                    </a:p>
+                  </a:txBody>
+                  <a:tcPr marL="128162" marR="128162" marT="64081" marB="64081" anchor="ctr">
+                    <a:lnL>
+                      <a:noFill/>
+                    </a:lnL>
+                    <a:lnR>
+                      <a:noFill/>
+                    </a:lnR>
+                    <a:lnT>
+                      <a:noFill/>
+                    </a:lnT>
+                    <a:lnB>
+                      <a:noFill/>
+                    </a:lnB>
+                    <a:noFill/>
+                  </a:tcPr>
+                </a:tc>
+                <a:extLst>
+                  <a:ext uri="{0D108BD9-81ED-4DB2-BD59-A6C34878D82A}">
+                    <a16:rowId xmlns:a16="http://schemas.microsoft.com/office/drawing/2014/main" val="1099136382"/>
+                  </a:ext>
+                </a:extLst>
+              </a:tr>
+              <a:tr h="948403">
+                <a:tc>
+                  <a:txBody>
+                    <a:bodyPr/>
+                    <a:lstStyle/>
+                    <a:p>
+                      <a:pPr>
+                        <a:buNone/>
+                      </a:pPr>
+                      <a:r>
+                        <a:rPr lang="en-US" sz="2500" dirty="0"/>
+                        <a:t>Release 1 </a:t>
+                      </a:r>
+                    </a:p>
+                  </a:txBody>
+                  <a:tcPr marL="128162" marR="128162" marT="64081" marB="64081" anchor="ctr">
+                    <a:lnL>
+                      <a:noFill/>
+                    </a:lnL>
+                    <a:lnR>
+                      <a:noFill/>
+                    </a:lnR>
+                    <a:lnT>
+                      <a:noFill/>
+                    </a:lnT>
+                    <a:lnB>
+                      <a:noFill/>
+                    </a:lnB>
+                    <a:noFill/>
+                  </a:tcPr>
+                </a:tc>
+                <a:tc>
+                  <a:txBody>
+                    <a:bodyPr/>
+                    <a:lstStyle/>
+                    <a:p>
+                      <a:pPr>
+                        <a:buNone/>
+                      </a:pPr>
+                      <a:r>
+                        <a:rPr lang="en-US" sz="2500" dirty="0"/>
+                        <a:t>User Registration, Login, Browse Products</a:t>
+                      </a:r>
+                    </a:p>
+                  </a:txBody>
+                  <a:tcPr marL="128162" marR="128162" marT="64081" marB="64081" anchor="ctr">
+                    <a:lnL>
+                      <a:noFill/>
+                    </a:lnL>
+                    <a:lnR>
+                      <a:noFill/>
+                    </a:lnR>
+                    <a:lnT>
+                      <a:noFill/>
+                    </a:lnT>
+                    <a:lnB>
+                      <a:noFill/>
+                    </a:lnB>
+                    <a:noFill/>
+                  </a:tcPr>
+                </a:tc>
+                <a:extLst>
+                  <a:ext uri="{0D108BD9-81ED-4DB2-BD59-A6C34878D82A}">
+                    <a16:rowId xmlns:a16="http://schemas.microsoft.com/office/drawing/2014/main" val="1578996664"/>
+                  </a:ext>
+                </a:extLst>
+              </a:tr>
+              <a:tr h="563915">
+                <a:tc>
+                  <a:txBody>
+                    <a:bodyPr/>
+                    <a:lstStyle/>
+                    <a:p>
+                      <a:pPr>
+                        <a:buNone/>
+                      </a:pPr>
+                      <a:r>
+                        <a:rPr lang="en-US" sz="2500"/>
+                        <a:t>Release 2</a:t>
+                      </a:r>
+                    </a:p>
+                  </a:txBody>
+                  <a:tcPr marL="128162" marR="128162" marT="64081" marB="64081" anchor="ctr">
+                    <a:lnL>
+                      <a:noFill/>
+                    </a:lnL>
+                    <a:lnR>
+                      <a:noFill/>
+                    </a:lnR>
+                    <a:lnT>
+                      <a:noFill/>
+                    </a:lnT>
+                    <a:lnB>
+                      <a:noFill/>
+                    </a:lnB>
+                    <a:noFill/>
+                  </a:tcPr>
+                </a:tc>
+                <a:tc>
+                  <a:txBody>
+                    <a:bodyPr/>
+                    <a:lstStyle/>
+                    <a:p>
+                      <a:pPr>
+                        <a:buNone/>
+                      </a:pPr>
+                      <a:r>
+                        <a:rPr lang="en-US" sz="2500" dirty="0"/>
+                        <a:t>Checkout, Search Products, Add to Cart</a:t>
+                      </a:r>
+                    </a:p>
+                  </a:txBody>
+                  <a:tcPr marL="128162" marR="128162" marT="64081" marB="64081" anchor="ctr">
+                    <a:lnL>
+                      <a:noFill/>
+                    </a:lnL>
+                    <a:lnR>
+                      <a:noFill/>
+                    </a:lnR>
+                    <a:lnT>
+                      <a:noFill/>
+                    </a:lnT>
+                    <a:lnB>
+                      <a:noFill/>
+                    </a:lnB>
+                    <a:noFill/>
+                  </a:tcPr>
+                </a:tc>
+                <a:extLst>
+                  <a:ext uri="{0D108BD9-81ED-4DB2-BD59-A6C34878D82A}">
+                    <a16:rowId xmlns:a16="http://schemas.microsoft.com/office/drawing/2014/main" val="1267600689"/>
+                  </a:ext>
+                </a:extLst>
+              </a:tr>
+              <a:tr h="948403">
+                <a:tc>
+                  <a:txBody>
+                    <a:bodyPr/>
+                    <a:lstStyle/>
+                    <a:p>
+                      <a:pPr>
+                        <a:buNone/>
+                      </a:pPr>
+                      <a:r>
+                        <a:rPr lang="en-US" sz="2500"/>
+                        <a:t>Release 3</a:t>
+                      </a:r>
+                    </a:p>
+                  </a:txBody>
+                  <a:tcPr marL="128162" marR="128162" marT="64081" marB="64081" anchor="ctr">
+                    <a:lnL>
+                      <a:noFill/>
+                    </a:lnL>
+                    <a:lnR>
+                      <a:noFill/>
+                    </a:lnR>
+                    <a:lnT>
+                      <a:noFill/>
+                    </a:lnT>
+                    <a:lnB>
+                      <a:noFill/>
+                    </a:lnB>
+                    <a:noFill/>
+                  </a:tcPr>
+                </a:tc>
+                <a:tc>
+                  <a:txBody>
+                    <a:bodyPr/>
+                    <a:lstStyle/>
+                    <a:p>
+                      <a:pPr>
+                        <a:buNone/>
+                      </a:pPr>
+                      <a:r>
+                        <a:rPr lang="en-US" sz="2500"/>
+                        <a:t>Track Orders, Wishlist, Review Products</a:t>
+                      </a:r>
+                    </a:p>
+                  </a:txBody>
+                  <a:tcPr marL="128162" marR="128162" marT="64081" marB="64081" anchor="ctr">
+                    <a:lnL>
+                      <a:noFill/>
+                    </a:lnL>
+                    <a:lnR>
+                      <a:noFill/>
+                    </a:lnR>
+                    <a:lnT>
+                      <a:noFill/>
+                    </a:lnT>
+                    <a:lnB>
+                      <a:noFill/>
+                    </a:lnB>
+                    <a:noFill/>
+                  </a:tcPr>
+                </a:tc>
+                <a:extLst>
+                  <a:ext uri="{0D108BD9-81ED-4DB2-BD59-A6C34878D82A}">
+                    <a16:rowId xmlns:a16="http://schemas.microsoft.com/office/drawing/2014/main" val="2078314053"/>
+                  </a:ext>
+                </a:extLst>
+              </a:tr>
+              <a:tr h="1332890">
+                <a:tc>
+                  <a:txBody>
+                    <a:bodyPr/>
+                    <a:lstStyle/>
+                    <a:p>
+                      <a:pPr>
+                        <a:buNone/>
+                      </a:pPr>
+                      <a:r>
+                        <a:rPr lang="en-US" sz="2500"/>
+                        <a:t>Release 4</a:t>
+                      </a:r>
+                    </a:p>
+                  </a:txBody>
+                  <a:tcPr marL="128162" marR="128162" marT="64081" marB="64081" anchor="ctr">
+                    <a:lnL>
+                      <a:noFill/>
+                    </a:lnL>
+                    <a:lnR>
+                      <a:noFill/>
+                    </a:lnR>
+                    <a:lnT>
+                      <a:noFill/>
+                    </a:lnT>
+                    <a:lnB>
+                      <a:noFill/>
+                    </a:lnB>
+                    <a:noFill/>
+                  </a:tcPr>
+                </a:tc>
+                <a:tc>
+                  <a:txBody>
+                    <a:bodyPr/>
+                    <a:lstStyle/>
+                    <a:p>
+                      <a:pPr>
+                        <a:buNone/>
+                      </a:pPr>
+                      <a:r>
+                        <a:rPr lang="en-US" sz="2500" dirty="0"/>
+                        <a:t>Admin Management (Add/Edit/Delete Products, View Reports)</a:t>
+                      </a:r>
+                    </a:p>
+                  </a:txBody>
+                  <a:tcPr marL="128162" marR="128162" marT="64081" marB="64081" anchor="ctr">
+                    <a:lnL>
+                      <a:noFill/>
+                    </a:lnL>
+                    <a:lnR>
+                      <a:noFill/>
+                    </a:lnR>
+                    <a:lnT>
+                      <a:noFill/>
+                    </a:lnT>
+                    <a:lnB>
+                      <a:noFill/>
+                    </a:lnB>
+                    <a:noFill/>
+                  </a:tcPr>
+                </a:tc>
+                <a:extLst>
+                  <a:ext uri="{0D108BD9-81ED-4DB2-BD59-A6C34878D82A}">
+                    <a16:rowId xmlns:a16="http://schemas.microsoft.com/office/drawing/2014/main" val="2877564795"/>
+                  </a:ext>
+                </a:extLst>
+              </a:tr>
+            </a:tbl>
+          </a:graphicData>
+        </a:graphic>
+      </p:graphicFrame>
+    </p:spTree>
+    <p:extLst>
+      <p:ext uri="{BB962C8B-B14F-4D97-AF65-F5344CB8AC3E}">
+        <p14:creationId xmlns:p14="http://schemas.microsoft.com/office/powerpoint/2010/main" val="894627120"/>
       </p:ext>
     </p:extLst>
   </p:cSld>

</xml_diff>